<commit_message>
Added LuceneAccess Project and LuceneAccess.Tests Project
</commit_message>
<xml_diff>
--- a/documentation/Architecture_v0.1.0.pptx
+++ b/documentation/Architecture_v0.1.0.pptx
@@ -6,7 +6,9 @@
   </p:sldMasterIdLst>
   <p:sldIdLst>
     <p:sldId id="256" r:id="rId2"/>
-    <p:sldId id="257" r:id="rId3"/>
+    <p:sldId id="258" r:id="rId3"/>
+    <p:sldId id="257" r:id="rId4"/>
+    <p:sldId id="259" r:id="rId5"/>
   </p:sldIdLst>
   <p:sldSz cx="9144000" cy="6858000" type="screen4x3"/>
   <p:notesSz cx="6858000" cy="9144000"/>
@@ -3960,14 +3962,542 @@
       </p:grpSpPr>
       <p:sp>
         <p:nvSpPr>
+          <p:cNvPr id="4" name="Rechteck 3"/>
+          <p:cNvSpPr/>
+          <p:nvPr/>
+        </p:nvSpPr>
+        <p:spPr>
+          <a:xfrm>
+            <a:off x="2182216" y="1855003"/>
+            <a:ext cx="5270103" cy="432048"/>
+          </a:xfrm>
+          <a:prstGeom prst="rect">
+            <a:avLst/>
+          </a:prstGeom>
+          <a:solidFill>
+            <a:schemeClr val="accent3"/>
+          </a:solidFill>
+          <a:ln>
+            <a:solidFill>
+              <a:schemeClr val="tx1"/>
+            </a:solidFill>
+          </a:ln>
+        </p:spPr>
+        <p:style>
+          <a:lnRef idx="2">
+            <a:schemeClr val="accent1">
+              <a:shade val="50000"/>
+            </a:schemeClr>
+          </a:lnRef>
+          <a:fillRef idx="1">
+            <a:schemeClr val="accent1"/>
+          </a:fillRef>
+          <a:effectRef idx="0">
+            <a:schemeClr val="accent1"/>
+          </a:effectRef>
+          <a:fontRef idx="minor">
+            <a:schemeClr val="lt1"/>
+          </a:fontRef>
+        </p:style>
+        <p:txBody>
+          <a:bodyPr rtlCol="0" anchor="ctr"/>
+          <a:lstStyle/>
+          <a:p>
+            <a:pPr algn="ctr"/>
+            <a:r>
+              <a:rPr lang="de-DE" sz="1000" dirty="0" smtClean="0">
+                <a:solidFill>
+                  <a:schemeClr val="tx1"/>
+                </a:solidFill>
+              </a:rPr>
+              <a:t>UI</a:t>
+            </a:r>
+            <a:endParaRPr lang="de-DE" sz="1000" dirty="0">
+              <a:solidFill>
+                <a:schemeClr val="tx1"/>
+              </a:solidFill>
+            </a:endParaRPr>
+          </a:p>
+        </p:txBody>
+      </p:sp>
+      <p:sp>
+        <p:nvSpPr>
+          <p:cNvPr id="5" name="Rechteck 4"/>
+          <p:cNvSpPr/>
+          <p:nvPr/>
+        </p:nvSpPr>
+        <p:spPr>
+          <a:xfrm>
+            <a:off x="2182217" y="2406305"/>
+            <a:ext cx="1584176" cy="504056"/>
+          </a:xfrm>
+          <a:prstGeom prst="rect">
+            <a:avLst/>
+          </a:prstGeom>
+          <a:solidFill>
+            <a:srgbClr val="FFC000"/>
+          </a:solidFill>
+          <a:ln>
+            <a:solidFill>
+              <a:schemeClr val="tx1"/>
+            </a:solidFill>
+          </a:ln>
+        </p:spPr>
+        <p:style>
+          <a:lnRef idx="2">
+            <a:schemeClr val="accent1">
+              <a:shade val="50000"/>
+            </a:schemeClr>
+          </a:lnRef>
+          <a:fillRef idx="1">
+            <a:schemeClr val="accent1"/>
+          </a:fillRef>
+          <a:effectRef idx="0">
+            <a:schemeClr val="accent1"/>
+          </a:effectRef>
+          <a:fontRef idx="minor">
+            <a:schemeClr val="lt1"/>
+          </a:fontRef>
+        </p:style>
+        <p:txBody>
+          <a:bodyPr rtlCol="0" anchor="ctr"/>
+          <a:lstStyle/>
+          <a:p>
+            <a:pPr algn="ctr"/>
+            <a:r>
+              <a:rPr lang="de-DE" sz="1000" dirty="0" err="1" smtClean="0">
+                <a:solidFill>
+                  <a:schemeClr val="tx1"/>
+                </a:solidFill>
+              </a:rPr>
+              <a:t>Indexing</a:t>
+            </a:r>
+            <a:endParaRPr lang="de-DE" sz="1000" dirty="0">
+              <a:solidFill>
+                <a:schemeClr val="tx1"/>
+              </a:solidFill>
+            </a:endParaRPr>
+          </a:p>
+        </p:txBody>
+      </p:sp>
+      <p:sp>
+        <p:nvSpPr>
+          <p:cNvPr id="6" name="Rechteck 5"/>
+          <p:cNvSpPr/>
+          <p:nvPr/>
+        </p:nvSpPr>
+        <p:spPr>
+          <a:xfrm>
+            <a:off x="3910409" y="2406305"/>
+            <a:ext cx="1656184" cy="504056"/>
+          </a:xfrm>
+          <a:prstGeom prst="rect">
+            <a:avLst/>
+          </a:prstGeom>
+          <a:solidFill>
+            <a:srgbClr val="FFC000"/>
+          </a:solidFill>
+          <a:ln>
+            <a:solidFill>
+              <a:schemeClr val="tx1"/>
+            </a:solidFill>
+          </a:ln>
+        </p:spPr>
+        <p:style>
+          <a:lnRef idx="2">
+            <a:schemeClr val="accent1">
+              <a:shade val="50000"/>
+            </a:schemeClr>
+          </a:lnRef>
+          <a:fillRef idx="1">
+            <a:schemeClr val="accent1"/>
+          </a:fillRef>
+          <a:effectRef idx="0">
+            <a:schemeClr val="accent1"/>
+          </a:effectRef>
+          <a:fontRef idx="minor">
+            <a:schemeClr val="lt1"/>
+          </a:fontRef>
+        </p:style>
+        <p:txBody>
+          <a:bodyPr rtlCol="0" anchor="ctr"/>
+          <a:lstStyle/>
+          <a:p>
+            <a:pPr algn="ctr"/>
+            <a:r>
+              <a:rPr lang="de-DE" sz="1000" dirty="0" err="1" smtClean="0">
+                <a:solidFill>
+                  <a:schemeClr val="tx1"/>
+                </a:solidFill>
+              </a:rPr>
+              <a:t>ResultRequests</a:t>
+            </a:r>
+            <a:endParaRPr lang="de-DE" sz="1000" dirty="0">
+              <a:solidFill>
+                <a:schemeClr val="tx1"/>
+              </a:solidFill>
+            </a:endParaRPr>
+          </a:p>
+        </p:txBody>
+      </p:sp>
+      <p:sp>
+        <p:nvSpPr>
+          <p:cNvPr id="7" name="Rechteck 6"/>
+          <p:cNvSpPr/>
+          <p:nvPr/>
+        </p:nvSpPr>
+        <p:spPr>
+          <a:xfrm>
+            <a:off x="5710609" y="2406305"/>
+            <a:ext cx="1741711" cy="504056"/>
+          </a:xfrm>
+          <a:prstGeom prst="rect">
+            <a:avLst/>
+          </a:prstGeom>
+          <a:solidFill>
+            <a:srgbClr val="FFC000"/>
+          </a:solidFill>
+          <a:ln>
+            <a:solidFill>
+              <a:schemeClr val="tx1"/>
+            </a:solidFill>
+          </a:ln>
+        </p:spPr>
+        <p:style>
+          <a:lnRef idx="2">
+            <a:schemeClr val="accent1">
+              <a:shade val="50000"/>
+            </a:schemeClr>
+          </a:lnRef>
+          <a:fillRef idx="1">
+            <a:schemeClr val="accent1"/>
+          </a:fillRef>
+          <a:effectRef idx="0">
+            <a:schemeClr val="accent1"/>
+          </a:effectRef>
+          <a:fontRef idx="minor">
+            <a:schemeClr val="lt1"/>
+          </a:fontRef>
+        </p:style>
+        <p:txBody>
+          <a:bodyPr rtlCol="0" anchor="ctr"/>
+          <a:lstStyle/>
+          <a:p>
+            <a:pPr algn="ctr"/>
+            <a:r>
+              <a:rPr lang="de-DE" sz="1000" dirty="0" err="1" smtClean="0">
+                <a:solidFill>
+                  <a:schemeClr val="tx1"/>
+                </a:solidFill>
+              </a:rPr>
+              <a:t>InformationGathering</a:t>
+            </a:r>
+            <a:endParaRPr lang="de-DE" sz="1000" dirty="0">
+              <a:solidFill>
+                <a:schemeClr val="tx1"/>
+              </a:solidFill>
+            </a:endParaRPr>
+          </a:p>
+        </p:txBody>
+      </p:sp>
+      <p:sp>
+        <p:nvSpPr>
+          <p:cNvPr id="8" name="Rechteck 7"/>
+          <p:cNvSpPr/>
+          <p:nvPr/>
+        </p:nvSpPr>
+        <p:spPr>
+          <a:xfrm>
+            <a:off x="2182216" y="3022048"/>
+            <a:ext cx="5270103" cy="504056"/>
+          </a:xfrm>
+          <a:prstGeom prst="rect">
+            <a:avLst/>
+          </a:prstGeom>
+          <a:solidFill>
+            <a:srgbClr val="FFC000"/>
+          </a:solidFill>
+          <a:ln>
+            <a:solidFill>
+              <a:schemeClr val="tx1"/>
+            </a:solidFill>
+          </a:ln>
+        </p:spPr>
+        <p:style>
+          <a:lnRef idx="2">
+            <a:schemeClr val="accent1">
+              <a:shade val="50000"/>
+            </a:schemeClr>
+          </a:lnRef>
+          <a:fillRef idx="1">
+            <a:schemeClr val="accent1"/>
+          </a:fillRef>
+          <a:effectRef idx="0">
+            <a:schemeClr val="accent1"/>
+          </a:effectRef>
+          <a:fontRef idx="minor">
+            <a:schemeClr val="lt1"/>
+          </a:fontRef>
+        </p:style>
+        <p:txBody>
+          <a:bodyPr rtlCol="0" anchor="ctr"/>
+          <a:lstStyle/>
+          <a:p>
+            <a:pPr algn="ctr"/>
+            <a:r>
+              <a:rPr lang="de-DE" sz="1000" dirty="0" err="1" smtClean="0">
+                <a:solidFill>
+                  <a:schemeClr val="tx1"/>
+                </a:solidFill>
+              </a:rPr>
+              <a:t>AccessManager</a:t>
+            </a:r>
+            <a:endParaRPr lang="de-DE" sz="1000" dirty="0">
+              <a:solidFill>
+                <a:schemeClr val="tx1"/>
+              </a:solidFill>
+            </a:endParaRPr>
+          </a:p>
+        </p:txBody>
+      </p:sp>
+      <p:sp>
+        <p:nvSpPr>
+          <p:cNvPr id="9" name="Rechteck 8"/>
+          <p:cNvSpPr/>
+          <p:nvPr/>
+        </p:nvSpPr>
+        <p:spPr>
+          <a:xfrm>
+            <a:off x="2185713" y="4293096"/>
+            <a:ext cx="2556284" cy="1395305"/>
+          </a:xfrm>
+          <a:prstGeom prst="rect">
+            <a:avLst/>
+          </a:prstGeom>
+          <a:solidFill>
+            <a:schemeClr val="bg2">
+              <a:lumMod val="75000"/>
+            </a:schemeClr>
+          </a:solidFill>
+          <a:ln>
+            <a:solidFill>
+              <a:schemeClr val="tx1"/>
+            </a:solidFill>
+          </a:ln>
+        </p:spPr>
+        <p:style>
+          <a:lnRef idx="2">
+            <a:schemeClr val="accent1">
+              <a:shade val="50000"/>
+            </a:schemeClr>
+          </a:lnRef>
+          <a:fillRef idx="1">
+            <a:schemeClr val="accent1"/>
+          </a:fillRef>
+          <a:effectRef idx="0">
+            <a:schemeClr val="accent1"/>
+          </a:effectRef>
+          <a:fontRef idx="minor">
+            <a:schemeClr val="lt1"/>
+          </a:fontRef>
+        </p:style>
+        <p:txBody>
+          <a:bodyPr rtlCol="0" anchor="ctr"/>
+          <a:lstStyle/>
+          <a:p>
+            <a:pPr algn="ctr"/>
+            <a:r>
+              <a:rPr lang="de-DE" sz="1000" dirty="0" err="1" smtClean="0">
+                <a:solidFill>
+                  <a:schemeClr val="tx1"/>
+                </a:solidFill>
+              </a:rPr>
+              <a:t>LuceneAccess</a:t>
+            </a:r>
+            <a:endParaRPr lang="de-DE" sz="1000" dirty="0">
+              <a:solidFill>
+                <a:schemeClr val="tx1"/>
+              </a:solidFill>
+            </a:endParaRPr>
+          </a:p>
+        </p:txBody>
+      </p:sp>
+      <p:sp>
+        <p:nvSpPr>
+          <p:cNvPr id="10" name="Rechteck 9"/>
+          <p:cNvSpPr/>
+          <p:nvPr/>
+        </p:nvSpPr>
+        <p:spPr>
+          <a:xfrm>
+            <a:off x="4863527" y="4293096"/>
+            <a:ext cx="2564467" cy="1395305"/>
+          </a:xfrm>
+          <a:prstGeom prst="rect">
+            <a:avLst/>
+          </a:prstGeom>
+          <a:solidFill>
+            <a:schemeClr val="bg2">
+              <a:lumMod val="75000"/>
+            </a:schemeClr>
+          </a:solidFill>
+          <a:ln>
+            <a:solidFill>
+              <a:schemeClr val="tx1"/>
+            </a:solidFill>
+          </a:ln>
+        </p:spPr>
+        <p:style>
+          <a:lnRef idx="2">
+            <a:schemeClr val="accent1">
+              <a:shade val="50000"/>
+            </a:schemeClr>
+          </a:lnRef>
+          <a:fillRef idx="1">
+            <a:schemeClr val="accent1"/>
+          </a:fillRef>
+          <a:effectRef idx="0">
+            <a:schemeClr val="accent1"/>
+          </a:effectRef>
+          <a:fontRef idx="minor">
+            <a:schemeClr val="lt1"/>
+          </a:fontRef>
+        </p:style>
+        <p:txBody>
+          <a:bodyPr rtlCol="0" anchor="ctr"/>
+          <a:lstStyle/>
+          <a:p>
+            <a:pPr algn="ctr"/>
+            <a:r>
+              <a:rPr lang="de-DE" sz="1000" dirty="0" err="1" smtClean="0">
+                <a:solidFill>
+                  <a:schemeClr val="tx1"/>
+                </a:solidFill>
+              </a:rPr>
+              <a:t>StructurefileAccess</a:t>
+            </a:r>
+            <a:endParaRPr lang="de-DE" sz="1000" dirty="0">
+              <a:solidFill>
+                <a:schemeClr val="tx1"/>
+              </a:solidFill>
+            </a:endParaRPr>
+          </a:p>
+        </p:txBody>
+      </p:sp>
+      <p:sp>
+        <p:nvSpPr>
+          <p:cNvPr id="11" name="Zylinder 10"/>
+          <p:cNvSpPr/>
+          <p:nvPr/>
+        </p:nvSpPr>
+        <p:spPr>
+          <a:xfrm>
+            <a:off x="3088263" y="5745719"/>
+            <a:ext cx="864096" cy="936104"/>
+          </a:xfrm>
+          <a:prstGeom prst="can">
+            <a:avLst/>
+          </a:prstGeom>
+          <a:noFill/>
+          <a:ln>
+            <a:solidFill>
+              <a:schemeClr val="tx1"/>
+            </a:solidFill>
+          </a:ln>
+        </p:spPr>
+        <p:style>
+          <a:lnRef idx="2">
+            <a:schemeClr val="accent1">
+              <a:shade val="50000"/>
+            </a:schemeClr>
+          </a:lnRef>
+          <a:fillRef idx="1">
+            <a:schemeClr val="accent1"/>
+          </a:fillRef>
+          <a:effectRef idx="0">
+            <a:schemeClr val="accent1"/>
+          </a:effectRef>
+          <a:fontRef idx="minor">
+            <a:schemeClr val="lt1"/>
+          </a:fontRef>
+        </p:style>
+        <p:txBody>
+          <a:bodyPr rtlCol="0" anchor="ctr"/>
+          <a:lstStyle/>
+          <a:p>
+            <a:pPr algn="ctr"/>
+            <a:endParaRPr lang="de-DE"/>
+          </a:p>
+        </p:txBody>
+      </p:sp>
+      <p:sp>
+        <p:nvSpPr>
+          <p:cNvPr id="13" name="Ellipse 12"/>
+          <p:cNvSpPr/>
+          <p:nvPr/>
+        </p:nvSpPr>
+        <p:spPr>
+          <a:xfrm>
+            <a:off x="5425680" y="5748503"/>
+            <a:ext cx="1440160" cy="576064"/>
+          </a:xfrm>
+          <a:prstGeom prst="ellipse">
+            <a:avLst/>
+          </a:prstGeom>
+          <a:noFill/>
+          <a:ln>
+            <a:solidFill>
+              <a:schemeClr val="tx1"/>
+            </a:solidFill>
+          </a:ln>
+        </p:spPr>
+        <p:style>
+          <a:lnRef idx="2">
+            <a:schemeClr val="accent1">
+              <a:shade val="50000"/>
+            </a:schemeClr>
+          </a:lnRef>
+          <a:fillRef idx="1">
+            <a:schemeClr val="accent1"/>
+          </a:fillRef>
+          <a:effectRef idx="0">
+            <a:schemeClr val="accent1"/>
+          </a:effectRef>
+          <a:fontRef idx="minor">
+            <a:schemeClr val="lt1"/>
+          </a:fontRef>
+        </p:style>
+        <p:txBody>
+          <a:bodyPr rtlCol="0" anchor="ctr"/>
+          <a:lstStyle/>
+          <a:p>
+            <a:pPr algn="ctr"/>
+            <a:r>
+              <a:rPr lang="de-DE" dirty="0" smtClean="0">
+                <a:solidFill>
+                  <a:schemeClr val="tx1"/>
+                </a:solidFill>
+              </a:rPr>
+              <a:t>.XML</a:t>
+            </a:r>
+            <a:endParaRPr lang="de-DE" dirty="0">
+              <a:solidFill>
+                <a:schemeClr val="tx1"/>
+              </a:solidFill>
+            </a:endParaRPr>
+          </a:p>
+        </p:txBody>
+      </p:sp>
+      <p:sp>
+        <p:nvSpPr>
           <p:cNvPr id="14" name="Rechteck 13"/>
           <p:cNvSpPr/>
           <p:nvPr/>
         </p:nvSpPr>
         <p:spPr>
           <a:xfrm>
-            <a:off x="2719853" y="932726"/>
-            <a:ext cx="2824071" cy="3816424"/>
+            <a:off x="1475656" y="1855002"/>
+            <a:ext cx="621142" cy="2297859"/>
           </a:xfrm>
           <a:prstGeom prst="rect">
             <a:avLst/>
@@ -4001,6 +4531,407 @@
           </a:fontRef>
         </p:style>
         <p:txBody>
+          <a:bodyPr rtlCol="0" anchor="ctr"/>
+          <a:lstStyle/>
+          <a:p>
+            <a:pPr algn="ctr"/>
+            <a:r>
+              <a:rPr lang="de-DE" sz="1000" dirty="0" err="1" smtClean="0">
+                <a:solidFill>
+                  <a:schemeClr val="tx1"/>
+                </a:solidFill>
+              </a:rPr>
+              <a:t>Logging</a:t>
+            </a:r>
+            <a:endParaRPr lang="de-DE" sz="1000" dirty="0">
+              <a:solidFill>
+                <a:schemeClr val="tx1"/>
+              </a:solidFill>
+            </a:endParaRPr>
+          </a:p>
+        </p:txBody>
+      </p:sp>
+      <p:sp>
+        <p:nvSpPr>
+          <p:cNvPr id="15" name="Rechteck 14"/>
+          <p:cNvSpPr/>
+          <p:nvPr/>
+        </p:nvSpPr>
+        <p:spPr>
+          <a:xfrm rot="5400000">
+            <a:off x="-252084" y="576884"/>
+            <a:ext cx="1013208" cy="191243"/>
+          </a:xfrm>
+          <a:prstGeom prst="rect">
+            <a:avLst/>
+          </a:prstGeom>
+          <a:solidFill>
+            <a:schemeClr val="accent5">
+              <a:lumMod val="60000"/>
+              <a:lumOff val="40000"/>
+            </a:schemeClr>
+          </a:solidFill>
+          <a:ln>
+            <a:noFill/>
+          </a:ln>
+        </p:spPr>
+        <p:style>
+          <a:lnRef idx="2">
+            <a:schemeClr val="accent1">
+              <a:shade val="50000"/>
+            </a:schemeClr>
+          </a:lnRef>
+          <a:fillRef idx="1">
+            <a:schemeClr val="accent1"/>
+          </a:fillRef>
+          <a:effectRef idx="0">
+            <a:schemeClr val="accent1"/>
+          </a:effectRef>
+          <a:fontRef idx="minor">
+            <a:schemeClr val="lt1"/>
+          </a:fontRef>
+        </p:style>
+        <p:txBody>
+          <a:bodyPr rtlCol="0" anchor="ctr"/>
+          <a:lstStyle/>
+          <a:p>
+            <a:r>
+              <a:rPr lang="de-DE" sz="1000" dirty="0" smtClean="0">
+                <a:solidFill>
+                  <a:schemeClr val="tx1"/>
+                </a:solidFill>
+              </a:rPr>
+              <a:t>Cross </a:t>
+            </a:r>
+            <a:r>
+              <a:rPr lang="de-DE" sz="1000" dirty="0" err="1" smtClean="0">
+                <a:solidFill>
+                  <a:schemeClr val="tx1"/>
+                </a:solidFill>
+              </a:rPr>
+              <a:t>Cutting</a:t>
+            </a:r>
+            <a:endParaRPr lang="de-DE" sz="1000" dirty="0">
+              <a:solidFill>
+                <a:schemeClr val="tx1"/>
+              </a:solidFill>
+            </a:endParaRPr>
+          </a:p>
+        </p:txBody>
+      </p:sp>
+      <p:sp>
+        <p:nvSpPr>
+          <p:cNvPr id="16" name="Rechteck 15"/>
+          <p:cNvSpPr/>
+          <p:nvPr/>
+        </p:nvSpPr>
+        <p:spPr>
+          <a:xfrm>
+            <a:off x="382362" y="176609"/>
+            <a:ext cx="1505675" cy="282419"/>
+          </a:xfrm>
+          <a:prstGeom prst="rect">
+            <a:avLst/>
+          </a:prstGeom>
+          <a:solidFill>
+            <a:schemeClr val="accent3"/>
+          </a:solidFill>
+          <a:ln>
+            <a:noFill/>
+          </a:ln>
+        </p:spPr>
+        <p:style>
+          <a:lnRef idx="2">
+            <a:schemeClr val="accent1">
+              <a:shade val="50000"/>
+            </a:schemeClr>
+          </a:lnRef>
+          <a:fillRef idx="1">
+            <a:schemeClr val="accent1"/>
+          </a:fillRef>
+          <a:effectRef idx="0">
+            <a:schemeClr val="accent1"/>
+          </a:effectRef>
+          <a:fontRef idx="minor">
+            <a:schemeClr val="lt1"/>
+          </a:fontRef>
+        </p:style>
+        <p:txBody>
+          <a:bodyPr rtlCol="0" anchor="ctr"/>
+          <a:lstStyle/>
+          <a:p>
+            <a:r>
+              <a:rPr lang="de-DE" sz="1000" dirty="0" smtClean="0">
+                <a:solidFill>
+                  <a:schemeClr val="tx1"/>
+                </a:solidFill>
+              </a:rPr>
+              <a:t>UI</a:t>
+            </a:r>
+            <a:endParaRPr lang="de-DE" sz="1000" dirty="0">
+              <a:solidFill>
+                <a:schemeClr val="tx1"/>
+              </a:solidFill>
+            </a:endParaRPr>
+          </a:p>
+        </p:txBody>
+      </p:sp>
+      <p:sp>
+        <p:nvSpPr>
+          <p:cNvPr id="18" name="Rechteck 17"/>
+          <p:cNvSpPr/>
+          <p:nvPr/>
+        </p:nvSpPr>
+        <p:spPr>
+          <a:xfrm>
+            <a:off x="382362" y="505653"/>
+            <a:ext cx="1512168" cy="331058"/>
+          </a:xfrm>
+          <a:prstGeom prst="rect">
+            <a:avLst/>
+          </a:prstGeom>
+          <a:solidFill>
+            <a:srgbClr val="FFC000"/>
+          </a:solidFill>
+          <a:ln>
+            <a:noFill/>
+          </a:ln>
+        </p:spPr>
+        <p:style>
+          <a:lnRef idx="2">
+            <a:schemeClr val="accent1">
+              <a:shade val="50000"/>
+            </a:schemeClr>
+          </a:lnRef>
+          <a:fillRef idx="1">
+            <a:schemeClr val="accent1"/>
+          </a:fillRef>
+          <a:effectRef idx="0">
+            <a:schemeClr val="accent1"/>
+          </a:effectRef>
+          <a:fontRef idx="minor">
+            <a:schemeClr val="lt1"/>
+          </a:fontRef>
+        </p:style>
+        <p:txBody>
+          <a:bodyPr rtlCol="0" anchor="ctr"/>
+          <a:lstStyle/>
+          <a:p>
+            <a:r>
+              <a:rPr lang="de-DE" sz="1000" dirty="0" err="1" smtClean="0">
+                <a:solidFill>
+                  <a:schemeClr val="tx1"/>
+                </a:solidFill>
+              </a:rPr>
+              <a:t>Logic</a:t>
+            </a:r>
+            <a:endParaRPr lang="de-DE" sz="1000" dirty="0">
+              <a:solidFill>
+                <a:schemeClr val="tx1"/>
+              </a:solidFill>
+            </a:endParaRPr>
+          </a:p>
+        </p:txBody>
+      </p:sp>
+      <p:sp>
+        <p:nvSpPr>
+          <p:cNvPr id="19" name="Rechteck 18"/>
+          <p:cNvSpPr/>
+          <p:nvPr/>
+        </p:nvSpPr>
+        <p:spPr>
+          <a:xfrm>
+            <a:off x="382362" y="883336"/>
+            <a:ext cx="1505253" cy="295773"/>
+          </a:xfrm>
+          <a:prstGeom prst="rect">
+            <a:avLst/>
+          </a:prstGeom>
+          <a:solidFill>
+            <a:schemeClr val="bg2">
+              <a:lumMod val="75000"/>
+            </a:schemeClr>
+          </a:solidFill>
+          <a:ln>
+            <a:noFill/>
+          </a:ln>
+        </p:spPr>
+        <p:style>
+          <a:lnRef idx="2">
+            <a:schemeClr val="accent1">
+              <a:shade val="50000"/>
+            </a:schemeClr>
+          </a:lnRef>
+          <a:fillRef idx="1">
+            <a:schemeClr val="accent1"/>
+          </a:fillRef>
+          <a:effectRef idx="0">
+            <a:schemeClr val="accent1"/>
+          </a:effectRef>
+          <a:fontRef idx="minor">
+            <a:schemeClr val="lt1"/>
+          </a:fontRef>
+        </p:style>
+        <p:txBody>
+          <a:bodyPr rtlCol="0" anchor="ctr"/>
+          <a:lstStyle/>
+          <a:p>
+            <a:r>
+              <a:rPr lang="de-DE" sz="1000" dirty="0" smtClean="0">
+                <a:solidFill>
+                  <a:schemeClr val="tx1"/>
+                </a:solidFill>
+              </a:rPr>
+              <a:t>Data</a:t>
+            </a:r>
+            <a:endParaRPr lang="de-DE" sz="1000" dirty="0">
+              <a:solidFill>
+                <a:schemeClr val="tx1"/>
+              </a:solidFill>
+            </a:endParaRPr>
+          </a:p>
+        </p:txBody>
+      </p:sp>
+      <p:sp>
+        <p:nvSpPr>
+          <p:cNvPr id="17" name="Rechteck 16"/>
+          <p:cNvSpPr/>
+          <p:nvPr/>
+        </p:nvSpPr>
+        <p:spPr>
+          <a:xfrm>
+            <a:off x="2452163" y="4145209"/>
+            <a:ext cx="1505253" cy="295773"/>
+          </a:xfrm>
+          <a:prstGeom prst="rect">
+            <a:avLst/>
+          </a:prstGeom>
+          <a:solidFill>
+            <a:schemeClr val="bg1"/>
+          </a:solidFill>
+          <a:ln>
+            <a:solidFill>
+              <a:schemeClr val="tx1"/>
+            </a:solidFill>
+          </a:ln>
+        </p:spPr>
+        <p:style>
+          <a:lnRef idx="2">
+            <a:schemeClr val="accent1">
+              <a:shade val="50000"/>
+            </a:schemeClr>
+          </a:lnRef>
+          <a:fillRef idx="1">
+            <a:schemeClr val="accent1"/>
+          </a:fillRef>
+          <a:effectRef idx="0">
+            <a:schemeClr val="accent1"/>
+          </a:effectRef>
+          <a:fontRef idx="minor">
+            <a:schemeClr val="lt1"/>
+          </a:fontRef>
+        </p:style>
+        <p:txBody>
+          <a:bodyPr rtlCol="0" anchor="ctr"/>
+          <a:lstStyle/>
+          <a:p>
+            <a:r>
+              <a:rPr lang="de-DE" sz="1000" dirty="0" err="1" smtClean="0">
+                <a:solidFill>
+                  <a:schemeClr val="tx1"/>
+                </a:solidFill>
+              </a:rPr>
+              <a:t>AddToIndex</a:t>
+            </a:r>
+            <a:r>
+              <a:rPr lang="de-DE" sz="1000" dirty="0" smtClean="0">
+                <a:solidFill>
+                  <a:schemeClr val="tx1"/>
+                </a:solidFill>
+              </a:rPr>
+              <a:t>(Filenames)</a:t>
+            </a:r>
+            <a:endParaRPr lang="de-DE" sz="1000" dirty="0">
+              <a:solidFill>
+                <a:schemeClr val="tx1"/>
+              </a:solidFill>
+            </a:endParaRPr>
+          </a:p>
+        </p:txBody>
+      </p:sp>
+    </p:spTree>
+    <p:extLst>
+      <p:ext uri="{BB962C8B-B14F-4D97-AF65-F5344CB8AC3E}">
+        <p14:creationId xmlns:p14="http://schemas.microsoft.com/office/powerpoint/2010/main" val="402315900"/>
+      </p:ext>
+    </p:extLst>
+  </p:cSld>
+  <p:clrMapOvr>
+    <a:masterClrMapping/>
+  </p:clrMapOvr>
+</p:sld>
+</file>
+
+<file path=ppt/slides/slide3.xml><?xml version="1.0" encoding="utf-8"?>
+<p:sld xmlns:a="http://schemas.openxmlformats.org/drawingml/2006/main" xmlns:r="http://schemas.openxmlformats.org/officeDocument/2006/relationships" xmlns:p="http://schemas.openxmlformats.org/presentationml/2006/main">
+  <p:cSld>
+    <p:spTree>
+      <p:nvGrpSpPr>
+        <p:cNvPr id="1" name=""/>
+        <p:cNvGrpSpPr/>
+        <p:nvPr/>
+      </p:nvGrpSpPr>
+      <p:grpSpPr>
+        <a:xfrm>
+          <a:off x="0" y="0"/>
+          <a:ext cx="0" cy="0"/>
+          <a:chOff x="0" y="0"/>
+          <a:chExt cx="0" cy="0"/>
+        </a:xfrm>
+      </p:grpSpPr>
+      <p:sp>
+        <p:nvSpPr>
+          <p:cNvPr id="14" name="Rechteck 13"/>
+          <p:cNvSpPr/>
+          <p:nvPr/>
+        </p:nvSpPr>
+        <p:spPr>
+          <a:xfrm>
+            <a:off x="755576" y="815305"/>
+            <a:ext cx="2824071" cy="3816424"/>
+          </a:xfrm>
+          <a:prstGeom prst="rect">
+            <a:avLst/>
+          </a:prstGeom>
+          <a:solidFill>
+            <a:schemeClr val="accent5">
+              <a:lumMod val="60000"/>
+              <a:lumOff val="40000"/>
+            </a:schemeClr>
+          </a:solidFill>
+          <a:ln>
+            <a:solidFill>
+              <a:schemeClr val="tx1"/>
+            </a:solidFill>
+          </a:ln>
+        </p:spPr>
+        <p:style>
+          <a:lnRef idx="2">
+            <a:schemeClr val="accent1">
+              <a:shade val="50000"/>
+            </a:schemeClr>
+          </a:lnRef>
+          <a:fillRef idx="1">
+            <a:schemeClr val="accent1"/>
+          </a:fillRef>
+          <a:effectRef idx="0">
+            <a:schemeClr val="accent1"/>
+          </a:effectRef>
+          <a:fontRef idx="minor">
+            <a:schemeClr val="lt1"/>
+          </a:fontRef>
+        </p:style>
+        <p:txBody>
           <a:bodyPr rtlCol="0" anchor="t"/>
           <a:lstStyle/>
           <a:p>
@@ -4028,7 +4959,7 @@
         </p:nvGrpSpPr>
         <p:grpSpPr>
           <a:xfrm>
-            <a:off x="4406356" y="1389376"/>
+            <a:off x="3579647" y="1271955"/>
             <a:ext cx="386970" cy="154195"/>
             <a:chOff x="1304710" y="2132856"/>
             <a:chExt cx="386970" cy="154195"/>
@@ -4124,7 +5055,7 @@
         </p:nvSpPr>
         <p:spPr>
           <a:xfrm>
-            <a:off x="4825877" y="1338273"/>
+            <a:off x="3999168" y="1220852"/>
             <a:ext cx="569387" cy="246221"/>
           </a:xfrm>
           <a:prstGeom prst="rect">
@@ -4154,7 +5085,7 @@
         </p:nvSpPr>
         <p:spPr>
           <a:xfrm>
-            <a:off x="3026512" y="1247860"/>
+            <a:off x="1442336" y="1130439"/>
             <a:ext cx="1361192" cy="437228"/>
           </a:xfrm>
           <a:prstGeom prst="rect">
@@ -4217,7 +5148,7 @@
         </p:nvSpPr>
         <p:spPr>
           <a:xfrm>
-            <a:off x="3026512" y="1782233"/>
+            <a:off x="1442336" y="1664812"/>
             <a:ext cx="1361192" cy="437228"/>
           </a:xfrm>
           <a:prstGeom prst="rect">
@@ -4280,7 +5211,7 @@
         </p:nvSpPr>
         <p:spPr>
           <a:xfrm>
-            <a:off x="3026512" y="2286289"/>
+            <a:off x="1442336" y="2168868"/>
             <a:ext cx="1361192" cy="437228"/>
           </a:xfrm>
           <a:prstGeom prst="rect">
@@ -4343,7 +5274,7 @@
         </p:nvSpPr>
         <p:spPr>
           <a:xfrm>
-            <a:off x="3026512" y="2827868"/>
+            <a:off x="1442336" y="2710447"/>
             <a:ext cx="1361192" cy="437228"/>
           </a:xfrm>
           <a:prstGeom prst="rect">
@@ -4406,7 +5337,7 @@
         </p:nvSpPr>
         <p:spPr>
           <a:xfrm>
-            <a:off x="3026508" y="3525013"/>
+            <a:off x="1442332" y="3407592"/>
             <a:ext cx="1361192" cy="437228"/>
           </a:xfrm>
           <a:prstGeom prst="rect">
@@ -4469,7 +5400,7 @@
         </p:nvSpPr>
         <p:spPr>
           <a:xfrm>
-            <a:off x="3025517" y="4029069"/>
+            <a:off x="1441341" y="3911648"/>
             <a:ext cx="1361192" cy="437228"/>
           </a:xfrm>
           <a:prstGeom prst="rect">
@@ -4526,13 +5457,13 @@
       </p:sp>
       <p:grpSp>
         <p:nvGrpSpPr>
-          <p:cNvPr id="41" name="Gruppieren 40"/>
+          <p:cNvPr id="25" name="Gruppieren 24"/>
           <p:cNvGrpSpPr/>
           <p:nvPr/>
         </p:nvGrpSpPr>
         <p:grpSpPr>
           <a:xfrm>
-            <a:off x="4406356" y="1923749"/>
+            <a:off x="3579647" y="1710377"/>
             <a:ext cx="386970" cy="154195"/>
             <a:chOff x="1304710" y="2132856"/>
             <a:chExt cx="386970" cy="154195"/>
@@ -4540,7 +5471,7 @@
         </p:grpSpPr>
         <p:cxnSp>
           <p:nvCxnSpPr>
-            <p:cNvPr id="42" name="Gerade Verbindung 41"/>
+            <p:cNvPr id="26" name="Gerade Verbindung 25"/>
             <p:cNvCxnSpPr/>
             <p:nvPr/>
           </p:nvCxnSpPr>
@@ -4575,7 +5506,7 @@
         </p:cxnSp>
         <p:sp>
           <p:nvSpPr>
-            <p:cNvPr id="43" name="Ellipse 42"/>
+            <p:cNvPr id="27" name="Ellipse 26"/>
             <p:cNvSpPr/>
             <p:nvPr/>
           </p:nvSpPr>
@@ -4622,14 +5553,14 @@
       </p:grpSp>
       <p:sp>
         <p:nvSpPr>
-          <p:cNvPr id="44" name="Textfeld 43"/>
+          <p:cNvPr id="28" name="Textfeld 27"/>
           <p:cNvSpPr txBox="1"/>
           <p:nvPr/>
         </p:nvSpPr>
         <p:spPr>
           <a:xfrm>
-            <a:off x="4825877" y="1872646"/>
-            <a:ext cx="569387" cy="246221"/>
+            <a:off x="3999168" y="1659274"/>
+            <a:ext cx="681597" cy="246221"/>
           </a:xfrm>
           <a:prstGeom prst="rect">
             <a:avLst/>
@@ -4644,21 +5575,112 @@
           <a:p>
             <a:r>
               <a:rPr lang="de-DE" sz="1000" dirty="0" err="1" smtClean="0"/>
-              <a:t>ILogger</a:t>
+              <a:t>ILoggable</a:t>
             </a:r>
             <a:endParaRPr lang="de-DE" sz="1000" dirty="0"/>
+          </a:p>
+        </p:txBody>
+      </p:sp>
+    </p:spTree>
+    <p:extLst>
+      <p:ext uri="{BB962C8B-B14F-4D97-AF65-F5344CB8AC3E}">
+        <p14:creationId xmlns:p14="http://schemas.microsoft.com/office/powerpoint/2010/main" val="3199571142"/>
+      </p:ext>
+    </p:extLst>
+  </p:cSld>
+  <p:clrMapOvr>
+    <a:masterClrMapping/>
+  </p:clrMapOvr>
+</p:sld>
+</file>
+
+<file path=ppt/slides/slide4.xml><?xml version="1.0" encoding="utf-8"?>
+<p:sld xmlns:a="http://schemas.openxmlformats.org/drawingml/2006/main" xmlns:r="http://schemas.openxmlformats.org/officeDocument/2006/relationships" xmlns:p="http://schemas.openxmlformats.org/presentationml/2006/main">
+  <p:cSld>
+    <p:spTree>
+      <p:nvGrpSpPr>
+        <p:cNvPr id="1" name=""/>
+        <p:cNvGrpSpPr/>
+        <p:nvPr/>
+      </p:nvGrpSpPr>
+      <p:grpSpPr>
+        <a:xfrm>
+          <a:off x="0" y="0"/>
+          <a:ext cx="0" cy="0"/>
+          <a:chOff x="0" y="0"/>
+          <a:chExt cx="0" cy="0"/>
+        </a:xfrm>
+      </p:grpSpPr>
+      <p:sp>
+        <p:nvSpPr>
+          <p:cNvPr id="21" name="Rechteck 20"/>
+          <p:cNvSpPr/>
+          <p:nvPr/>
+        </p:nvSpPr>
+        <p:spPr>
+          <a:xfrm>
+            <a:off x="539552" y="1012724"/>
+            <a:ext cx="2808312" cy="4504508"/>
+          </a:xfrm>
+          <a:prstGeom prst="rect">
+            <a:avLst/>
+          </a:prstGeom>
+          <a:solidFill>
+            <a:schemeClr val="bg2">
+              <a:lumMod val="75000"/>
+            </a:schemeClr>
+          </a:solidFill>
+          <a:ln>
+            <a:solidFill>
+              <a:schemeClr val="tx1"/>
+            </a:solidFill>
+          </a:ln>
+        </p:spPr>
+        <p:style>
+          <a:lnRef idx="2">
+            <a:schemeClr val="accent1">
+              <a:shade val="50000"/>
+            </a:schemeClr>
+          </a:lnRef>
+          <a:fillRef idx="1">
+            <a:schemeClr val="accent1"/>
+          </a:fillRef>
+          <a:effectRef idx="0">
+            <a:schemeClr val="accent1"/>
+          </a:effectRef>
+          <a:fontRef idx="minor">
+            <a:schemeClr val="lt1"/>
+          </a:fontRef>
+        </p:style>
+        <p:txBody>
+          <a:bodyPr rtlCol="0" anchor="t"/>
+          <a:lstStyle/>
+          <a:p>
+            <a:r>
+              <a:rPr lang="de-DE" sz="1000" dirty="0" err="1" smtClean="0">
+                <a:solidFill>
+                  <a:schemeClr val="tx1"/>
+                </a:solidFill>
+              </a:rPr>
+              <a:t>LuceneAccess</a:t>
+            </a:r>
+            <a:endParaRPr lang="de-DE" sz="1000" dirty="0">
+              <a:solidFill>
+                <a:schemeClr val="tx1"/>
+              </a:solidFill>
+            </a:endParaRPr>
           </a:p>
         </p:txBody>
       </p:sp>
       <p:grpSp>
         <p:nvGrpSpPr>
-          <p:cNvPr id="45" name="Gruppieren 44"/>
+          <p:cNvPr id="15" name="Gruppieren 14"/>
           <p:cNvGrpSpPr/>
           <p:nvPr/>
         </p:nvGrpSpPr>
         <p:grpSpPr>
           <a:xfrm>
-            <a:off x="4406356" y="2427805"/>
+            <a:off x="2436800" y="3724816"/>
             <a:ext cx="386970" cy="154195"/>
             <a:chOff x="1304710" y="2132856"/>
             <a:chExt cx="386970" cy="154195"/>
@@ -4666,7 +5688,7 @@
         </p:grpSpPr>
         <p:cxnSp>
           <p:nvCxnSpPr>
-            <p:cNvPr id="46" name="Gerade Verbindung 45"/>
+            <p:cNvPr id="3" name="Gerade Verbindung 2"/>
             <p:cNvCxnSpPr/>
             <p:nvPr/>
           </p:nvCxnSpPr>
@@ -4701,7 +5723,7 @@
         </p:cxnSp>
         <p:sp>
           <p:nvSpPr>
-            <p:cNvPr id="47" name="Ellipse 46"/>
+            <p:cNvPr id="12" name="Ellipse 11"/>
             <p:cNvSpPr/>
             <p:nvPr/>
           </p:nvSpPr>
@@ -4746,16 +5768,51 @@
           </p:txBody>
         </p:sp>
       </p:grpSp>
-      <p:sp>
-        <p:nvSpPr>
-          <p:cNvPr id="48" name="Textfeld 47"/>
+      <p:cxnSp>
+        <p:nvCxnSpPr>
+          <p:cNvPr id="26" name="Gerade Verbindung 25"/>
+          <p:cNvCxnSpPr/>
+          <p:nvPr/>
+        </p:nvCxnSpPr>
+        <p:spPr>
+          <a:xfrm>
+            <a:off x="2436800" y="2987575"/>
+            <a:ext cx="242954" cy="0"/>
+          </a:xfrm>
+          <a:prstGeom prst="line">
+            <a:avLst/>
+          </a:prstGeom>
+          <a:ln w="28575">
+            <a:solidFill>
+              <a:schemeClr val="tx1"/>
+            </a:solidFill>
+          </a:ln>
+        </p:spPr>
+        <p:style>
+          <a:lnRef idx="1">
+            <a:schemeClr val="accent1"/>
+          </a:lnRef>
+          <a:fillRef idx="0">
+            <a:schemeClr val="accent1"/>
+          </a:fillRef>
+          <a:effectRef idx="0">
+            <a:schemeClr val="accent1"/>
+          </a:effectRef>
+          <a:fontRef idx="minor">
+            <a:schemeClr val="tx1"/>
+          </a:fontRef>
+        </p:style>
+      </p:cxnSp>
+      <p:sp>
+        <p:nvSpPr>
+          <p:cNvPr id="28" name="Textfeld 27"/>
           <p:cNvSpPr txBox="1"/>
           <p:nvPr/>
         </p:nvSpPr>
         <p:spPr>
           <a:xfrm>
-            <a:off x="4825877" y="2376702"/>
-            <a:ext cx="569387" cy="246221"/>
+            <a:off x="2856321" y="2864464"/>
+            <a:ext cx="681597" cy="246221"/>
           </a:xfrm>
           <a:prstGeom prst="rect">
             <a:avLst/>
@@ -4770,142 +5827,371 @@
           <a:p>
             <a:r>
               <a:rPr lang="de-DE" sz="1000" dirty="0" err="1" smtClean="0"/>
-              <a:t>ILogger</a:t>
+              <a:t>ILoggable</a:t>
             </a:r>
             <a:endParaRPr lang="de-DE" sz="1000" dirty="0"/>
           </a:p>
         </p:txBody>
       </p:sp>
-      <p:grpSp>
-        <p:nvGrpSpPr>
-          <p:cNvPr id="49" name="Gruppieren 48"/>
-          <p:cNvGrpSpPr/>
+      <p:sp>
+        <p:nvSpPr>
+          <p:cNvPr id="22" name="Rechteck 21"/>
+          <p:cNvSpPr/>
           <p:nvPr/>
-        </p:nvGrpSpPr>
-        <p:grpSpPr>
-          <a:xfrm>
-            <a:off x="4399599" y="2969384"/>
-            <a:ext cx="386970" cy="154195"/>
-            <a:chOff x="1304710" y="2132856"/>
-            <a:chExt cx="386970" cy="154195"/>
-          </a:xfrm>
-        </p:grpSpPr>
-        <p:cxnSp>
-          <p:nvCxnSpPr>
-            <p:cNvPr id="50" name="Gerade Verbindung 49"/>
-            <p:cNvCxnSpPr/>
-            <p:nvPr/>
-          </p:nvCxnSpPr>
-          <p:spPr>
-            <a:xfrm>
-              <a:off x="1304710" y="2204864"/>
-              <a:ext cx="242954" cy="0"/>
-            </a:xfrm>
-            <a:prstGeom prst="line">
-              <a:avLst/>
-            </a:prstGeom>
-            <a:ln w="28575">
+        </p:nvSpPr>
+        <p:spPr>
+          <a:xfrm>
+            <a:off x="2854026" y="3717032"/>
+            <a:ext cx="3768805" cy="1512168"/>
+          </a:xfrm>
+          <a:prstGeom prst="rect">
+            <a:avLst/>
+          </a:prstGeom>
+          <a:solidFill>
+            <a:schemeClr val="bg1"/>
+          </a:solidFill>
+          <a:ln>
+            <a:solidFill>
+              <a:schemeClr val="tx1"/>
+            </a:solidFill>
+          </a:ln>
+        </p:spPr>
+        <p:style>
+          <a:lnRef idx="2">
+            <a:schemeClr val="accent1">
+              <a:shade val="50000"/>
+            </a:schemeClr>
+          </a:lnRef>
+          <a:fillRef idx="1">
+            <a:schemeClr val="accent1"/>
+          </a:fillRef>
+          <a:effectRef idx="0">
+            <a:schemeClr val="accent1"/>
+          </a:effectRef>
+          <a:fontRef idx="minor">
+            <a:schemeClr val="lt1"/>
+          </a:fontRef>
+        </p:style>
+        <p:txBody>
+          <a:bodyPr rtlCol="0" anchor="t"/>
+          <a:lstStyle/>
+          <a:p>
+            <a:r>
+              <a:rPr lang="de-DE" sz="1000" dirty="0" err="1" smtClean="0">
+                <a:solidFill>
+                  <a:schemeClr val="tx1"/>
+                </a:solidFill>
+              </a:rPr>
+              <a:t>ILuceneIndexAccess</a:t>
+            </a:r>
+            <a:endParaRPr lang="de-DE" sz="1000" dirty="0" smtClean="0">
               <a:solidFill>
                 <a:schemeClr val="tx1"/>
               </a:solidFill>
-            </a:ln>
-          </p:spPr>
-          <p:style>
-            <a:lnRef idx="1">
-              <a:schemeClr val="accent1"/>
-            </a:lnRef>
-            <a:fillRef idx="0">
-              <a:schemeClr val="accent1"/>
-            </a:fillRef>
-            <a:effectRef idx="0">
-              <a:schemeClr val="accent1"/>
-            </a:effectRef>
-            <a:fontRef idx="minor">
-              <a:schemeClr val="tx1"/>
-            </a:fontRef>
-          </p:style>
-        </p:cxnSp>
-        <p:sp>
-          <p:nvSpPr>
-            <p:cNvPr id="51" name="Ellipse 50"/>
-            <p:cNvSpPr/>
-            <p:nvPr/>
-          </p:nvSpPr>
-          <p:spPr>
-            <a:xfrm>
-              <a:off x="1547664" y="2132856"/>
-              <a:ext cx="144016" cy="154195"/>
-            </a:xfrm>
-            <a:prstGeom prst="ellipse">
-              <a:avLst/>
-            </a:prstGeom>
-            <a:noFill/>
-            <a:ln>
+            </a:endParaRPr>
+          </a:p>
+          <a:p>
+            <a:endParaRPr lang="de-DE" sz="1000" dirty="0" smtClean="0">
               <a:solidFill>
                 <a:schemeClr val="tx1"/>
               </a:solidFill>
-            </a:ln>
-          </p:spPr>
-          <p:style>
-            <a:lnRef idx="2">
-              <a:schemeClr val="accent1">
-                <a:shade val="50000"/>
-              </a:schemeClr>
-            </a:lnRef>
-            <a:fillRef idx="1">
-              <a:schemeClr val="accent1"/>
-            </a:fillRef>
-            <a:effectRef idx="0">
-              <a:schemeClr val="accent1"/>
-            </a:effectRef>
-            <a:fontRef idx="minor">
-              <a:schemeClr val="lt1"/>
-            </a:fontRef>
-          </p:style>
-          <p:txBody>
-            <a:bodyPr rtlCol="0" anchor="ctr"/>
-            <a:lstStyle/>
-            <a:p>
-              <a:pPr algn="ctr"/>
-              <a:endParaRPr lang="de-DE"/>
-            </a:p>
-          </p:txBody>
-        </p:sp>
-      </p:grpSp>
-      <p:sp>
-        <p:nvSpPr>
-          <p:cNvPr id="52" name="Textfeld 51"/>
-          <p:cNvSpPr txBox="1"/>
+            </a:endParaRPr>
+          </a:p>
+          <a:p>
+            <a:r>
+              <a:rPr lang="de-DE" sz="1000" dirty="0" smtClean="0">
+                <a:solidFill>
+                  <a:schemeClr val="tx1"/>
+                </a:solidFill>
+              </a:rPr>
+              <a:t>String </a:t>
+            </a:r>
+            <a:r>
+              <a:rPr lang="de-DE" sz="1000" dirty="0" err="1" smtClean="0">
+                <a:solidFill>
+                  <a:schemeClr val="tx1"/>
+                </a:solidFill>
+              </a:rPr>
+              <a:t>ParentTargetPathForImportedDocuments</a:t>
+            </a:r>
+            <a:r>
+              <a:rPr lang="de-DE" sz="1000" dirty="0" smtClean="0">
+                <a:solidFill>
+                  <a:schemeClr val="tx1"/>
+                </a:solidFill>
+              </a:rPr>
+              <a:t>=„“</a:t>
+            </a:r>
+          </a:p>
+          <a:p>
+            <a:endParaRPr lang="de-DE" sz="1000" dirty="0">
+              <a:solidFill>
+                <a:schemeClr val="tx1"/>
+              </a:solidFill>
+            </a:endParaRPr>
+          </a:p>
+          <a:p>
+            <a:endParaRPr lang="de-DE" sz="1000" dirty="0" smtClean="0">
+              <a:solidFill>
+                <a:schemeClr val="tx1"/>
+              </a:solidFill>
+            </a:endParaRPr>
+          </a:p>
+          <a:p>
+            <a:r>
+              <a:rPr lang="de-DE" sz="1000" dirty="0" err="1" smtClean="0">
+                <a:solidFill>
+                  <a:schemeClr val="tx1"/>
+                </a:solidFill>
+              </a:rPr>
+              <a:t>AddToIndex</a:t>
+            </a:r>
+            <a:r>
+              <a:rPr lang="de-DE" sz="1000" dirty="0" smtClean="0">
+                <a:solidFill>
+                  <a:schemeClr val="tx1"/>
+                </a:solidFill>
+              </a:rPr>
+              <a:t>(</a:t>
+            </a:r>
+            <a:r>
+              <a:rPr lang="de-DE" sz="1000" dirty="0" err="1" smtClean="0">
+                <a:solidFill>
+                  <a:schemeClr val="tx1"/>
+                </a:solidFill>
+              </a:rPr>
+              <a:t>IndexFolder</a:t>
+            </a:r>
+            <a:r>
+              <a:rPr lang="de-DE" sz="1000" dirty="0" smtClean="0">
+                <a:solidFill>
+                  <a:schemeClr val="tx1"/>
+                </a:solidFill>
+              </a:rPr>
+              <a:t>, Filename)</a:t>
+            </a:r>
+            <a:r>
+              <a:rPr lang="de-DE" sz="1000" dirty="0">
+                <a:solidFill>
+                  <a:schemeClr val="tx1"/>
+                </a:solidFill>
+              </a:rPr>
+              <a:t/>
+            </a:r>
+            <a:br>
+              <a:rPr lang="de-DE" sz="1000" dirty="0">
+                <a:solidFill>
+                  <a:schemeClr val="tx1"/>
+                </a:solidFill>
+              </a:rPr>
+            </a:br>
+            <a:r>
+              <a:rPr lang="de-DE" sz="1000" dirty="0" err="1" smtClean="0">
+                <a:solidFill>
+                  <a:schemeClr val="tx1"/>
+                </a:solidFill>
+              </a:rPr>
+              <a:t>AddToIndex</a:t>
+            </a:r>
+            <a:r>
+              <a:rPr lang="de-DE" sz="1000" dirty="0" smtClean="0">
+                <a:solidFill>
+                  <a:schemeClr val="tx1"/>
+                </a:solidFill>
+              </a:rPr>
+              <a:t>(</a:t>
+            </a:r>
+            <a:r>
+              <a:rPr lang="de-DE" sz="1000" dirty="0" err="1">
+                <a:solidFill>
+                  <a:schemeClr val="tx1"/>
+                </a:solidFill>
+              </a:rPr>
+              <a:t>IndexFolder</a:t>
+            </a:r>
+            <a:r>
+              <a:rPr lang="de-DE" sz="1000" dirty="0" smtClean="0">
+                <a:solidFill>
+                  <a:schemeClr val="tx1"/>
+                </a:solidFill>
+              </a:rPr>
+              <a:t>, Filenames)</a:t>
+            </a:r>
+          </a:p>
+          <a:p>
+            <a:r>
+              <a:rPr lang="de-DE" sz="1000" dirty="0" err="1" smtClean="0">
+                <a:solidFill>
+                  <a:schemeClr val="tx1"/>
+                </a:solidFill>
+              </a:rPr>
+              <a:t>AddToIndex</a:t>
+            </a:r>
+            <a:r>
+              <a:rPr lang="de-DE" sz="1000" dirty="0" smtClean="0">
+                <a:solidFill>
+                  <a:schemeClr val="tx1"/>
+                </a:solidFill>
+              </a:rPr>
+              <a:t>(</a:t>
+            </a:r>
+            <a:r>
+              <a:rPr lang="de-DE" sz="1000" dirty="0" err="1">
+                <a:solidFill>
+                  <a:schemeClr val="tx1"/>
+                </a:solidFill>
+              </a:rPr>
+              <a:t>IndexFolder</a:t>
+            </a:r>
+            <a:r>
+              <a:rPr lang="de-DE" sz="1000" dirty="0" smtClean="0">
+                <a:solidFill>
+                  <a:schemeClr val="tx1"/>
+                </a:solidFill>
+              </a:rPr>
+              <a:t>, </a:t>
+            </a:r>
+            <a:r>
+              <a:rPr lang="de-DE" sz="1000" dirty="0" err="1" smtClean="0">
+                <a:solidFill>
+                  <a:schemeClr val="tx1"/>
+                </a:solidFill>
+              </a:rPr>
+              <a:t>Foldername,withSubFolders</a:t>
+            </a:r>
+            <a:r>
+              <a:rPr lang="de-DE" sz="1000" dirty="0" smtClean="0">
+                <a:solidFill>
+                  <a:schemeClr val="tx1"/>
+                </a:solidFill>
+              </a:rPr>
+              <a:t>)</a:t>
+            </a:r>
+            <a:endParaRPr lang="de-DE" sz="1000" dirty="0">
+              <a:solidFill>
+                <a:schemeClr val="tx1"/>
+              </a:solidFill>
+            </a:endParaRPr>
+          </a:p>
+        </p:txBody>
+      </p:sp>
+      <p:sp>
+        <p:nvSpPr>
+          <p:cNvPr id="2" name="Halbbogen 1"/>
+          <p:cNvSpPr/>
           <p:nvPr/>
         </p:nvSpPr>
         <p:spPr>
-          <a:xfrm>
-            <a:off x="4819120" y="2918281"/>
-            <a:ext cx="569387" cy="246221"/>
+          <a:xfrm rot="16200000">
+            <a:off x="2685422" y="2873894"/>
+            <a:ext cx="216024" cy="227361"/>
+          </a:xfrm>
+          <a:prstGeom prst="blockArc">
+            <a:avLst/>
+          </a:prstGeom>
+          <a:solidFill>
+            <a:schemeClr val="bg1"/>
+          </a:solidFill>
+          <a:ln>
+            <a:solidFill>
+              <a:schemeClr val="tx1"/>
+            </a:solidFill>
+          </a:ln>
+        </p:spPr>
+        <p:style>
+          <a:lnRef idx="2">
+            <a:schemeClr val="accent1">
+              <a:shade val="50000"/>
+            </a:schemeClr>
+          </a:lnRef>
+          <a:fillRef idx="1">
+            <a:schemeClr val="accent1"/>
+          </a:fillRef>
+          <a:effectRef idx="0">
+            <a:schemeClr val="accent1"/>
+          </a:effectRef>
+          <a:fontRef idx="minor">
+            <a:schemeClr val="lt1"/>
+          </a:fontRef>
+        </p:style>
+        <p:txBody>
+          <a:bodyPr rtlCol="0" anchor="ctr"/>
+          <a:lstStyle/>
+          <a:p>
+            <a:pPr algn="ctr"/>
+            <a:endParaRPr lang="de-DE">
+              <a:solidFill>
+                <a:schemeClr val="tx1"/>
+              </a:solidFill>
+            </a:endParaRPr>
+          </a:p>
+        </p:txBody>
+      </p:sp>
+      <p:sp>
+        <p:nvSpPr>
+          <p:cNvPr id="23" name="Rechteck 22"/>
+          <p:cNvSpPr/>
+          <p:nvPr/>
+        </p:nvSpPr>
+        <p:spPr>
+          <a:xfrm>
+            <a:off x="1115616" y="2636912"/>
+            <a:ext cx="1308212" cy="1480172"/>
           </a:xfrm>
           <a:prstGeom prst="rect">
             <a:avLst/>
           </a:prstGeom>
-          <a:noFill/>
-        </p:spPr>
-        <p:txBody>
-          <a:bodyPr wrap="none" rtlCol="0">
-            <a:spAutoFit/>
-          </a:bodyPr>
-          <a:lstStyle/>
-          <a:p>
-            <a:r>
-              <a:rPr lang="de-DE" sz="1000" dirty="0" err="1" smtClean="0"/>
-              <a:t>ILogger</a:t>
-            </a:r>
-            <a:endParaRPr lang="de-DE" sz="1000" dirty="0"/>
+          <a:solidFill>
+            <a:schemeClr val="bg2">
+              <a:lumMod val="75000"/>
+            </a:schemeClr>
+          </a:solidFill>
+          <a:ln>
+            <a:solidFill>
+              <a:schemeClr val="tx1"/>
+            </a:solidFill>
+          </a:ln>
+        </p:spPr>
+        <p:style>
+          <a:lnRef idx="2">
+            <a:schemeClr val="accent1">
+              <a:shade val="50000"/>
+            </a:schemeClr>
+          </a:lnRef>
+          <a:fillRef idx="1">
+            <a:schemeClr val="accent1"/>
+          </a:fillRef>
+          <a:effectRef idx="0">
+            <a:schemeClr val="accent1"/>
+          </a:effectRef>
+          <a:fontRef idx="minor">
+            <a:schemeClr val="lt1"/>
+          </a:fontRef>
+        </p:style>
+        <p:txBody>
+          <a:bodyPr rtlCol="0" anchor="t"/>
+          <a:lstStyle/>
+          <a:p>
+            <a:r>
+              <a:rPr lang="de-DE" sz="1000" dirty="0" err="1" smtClean="0">
+                <a:solidFill>
+                  <a:schemeClr val="tx1"/>
+                </a:solidFill>
+              </a:rPr>
+              <a:t>AccessController</a:t>
+            </a:r>
+            <a:endParaRPr lang="de-DE" sz="1000" dirty="0">
+              <a:solidFill>
+                <a:schemeClr val="tx1"/>
+              </a:solidFill>
+            </a:endParaRPr>
           </a:p>
         </p:txBody>
       </p:sp>
     </p:spTree>
     <p:extLst>
       <p:ext uri="{BB962C8B-B14F-4D97-AF65-F5344CB8AC3E}">
-        <p14:creationId xmlns:p14="http://schemas.microsoft.com/office/powerpoint/2010/main" val="3199571142"/>
+        <p14:creationId xmlns:p14="http://schemas.microsoft.com/office/powerpoint/2010/main" val="1585926268"/>
       </p:ext>
     </p:extLst>
   </p:cSld>

</xml_diff>

<commit_message>
Added Logic.DocumentAccessing Assembly to provide public interfaces for LuceneAccessController
</commit_message>
<xml_diff>
--- a/documentation/Architecture_v0.1.0.pptx
+++ b/documentation/Architecture_v0.1.0.pptx
@@ -290,7 +290,7 @@
           <a:p>
             <a:fld id="{B5453A2F-AD27-4E66-90E5-CEA494DEF62A}" type="datetimeFigureOut">
               <a:rPr lang="de-DE" smtClean="0"/>
-              <a:t>30.06.2022</a:t>
+              <a:t>03.07.2022</a:t>
             </a:fld>
             <a:endParaRPr lang="de-DE"/>
           </a:p>
@@ -460,7 +460,7 @@
           <a:p>
             <a:fld id="{B5453A2F-AD27-4E66-90E5-CEA494DEF62A}" type="datetimeFigureOut">
               <a:rPr lang="de-DE" smtClean="0"/>
-              <a:t>30.06.2022</a:t>
+              <a:t>03.07.2022</a:t>
             </a:fld>
             <a:endParaRPr lang="de-DE"/>
           </a:p>
@@ -640,7 +640,7 @@
           <a:p>
             <a:fld id="{B5453A2F-AD27-4E66-90E5-CEA494DEF62A}" type="datetimeFigureOut">
               <a:rPr lang="de-DE" smtClean="0"/>
-              <a:t>30.06.2022</a:t>
+              <a:t>03.07.2022</a:t>
             </a:fld>
             <a:endParaRPr lang="de-DE"/>
           </a:p>
@@ -810,7 +810,7 @@
           <a:p>
             <a:fld id="{B5453A2F-AD27-4E66-90E5-CEA494DEF62A}" type="datetimeFigureOut">
               <a:rPr lang="de-DE" smtClean="0"/>
-              <a:t>30.06.2022</a:t>
+              <a:t>03.07.2022</a:t>
             </a:fld>
             <a:endParaRPr lang="de-DE"/>
           </a:p>
@@ -1056,7 +1056,7 @@
           <a:p>
             <a:fld id="{B5453A2F-AD27-4E66-90E5-CEA494DEF62A}" type="datetimeFigureOut">
               <a:rPr lang="de-DE" smtClean="0"/>
-              <a:t>30.06.2022</a:t>
+              <a:t>03.07.2022</a:t>
             </a:fld>
             <a:endParaRPr lang="de-DE"/>
           </a:p>
@@ -1344,7 +1344,7 @@
           <a:p>
             <a:fld id="{B5453A2F-AD27-4E66-90E5-CEA494DEF62A}" type="datetimeFigureOut">
               <a:rPr lang="de-DE" smtClean="0"/>
-              <a:t>30.06.2022</a:t>
+              <a:t>03.07.2022</a:t>
             </a:fld>
             <a:endParaRPr lang="de-DE"/>
           </a:p>
@@ -1766,7 +1766,7 @@
           <a:p>
             <a:fld id="{B5453A2F-AD27-4E66-90E5-CEA494DEF62A}" type="datetimeFigureOut">
               <a:rPr lang="de-DE" smtClean="0"/>
-              <a:t>30.06.2022</a:t>
+              <a:t>03.07.2022</a:t>
             </a:fld>
             <a:endParaRPr lang="de-DE"/>
           </a:p>
@@ -1884,7 +1884,7 @@
           <a:p>
             <a:fld id="{B5453A2F-AD27-4E66-90E5-CEA494DEF62A}" type="datetimeFigureOut">
               <a:rPr lang="de-DE" smtClean="0"/>
-              <a:t>30.06.2022</a:t>
+              <a:t>03.07.2022</a:t>
             </a:fld>
             <a:endParaRPr lang="de-DE"/>
           </a:p>
@@ -1979,7 +1979,7 @@
           <a:p>
             <a:fld id="{B5453A2F-AD27-4E66-90E5-CEA494DEF62A}" type="datetimeFigureOut">
               <a:rPr lang="de-DE" smtClean="0"/>
-              <a:t>30.06.2022</a:t>
+              <a:t>03.07.2022</a:t>
             </a:fld>
             <a:endParaRPr lang="de-DE"/>
           </a:p>
@@ -2256,7 +2256,7 @@
           <a:p>
             <a:fld id="{B5453A2F-AD27-4E66-90E5-CEA494DEF62A}" type="datetimeFigureOut">
               <a:rPr lang="de-DE" smtClean="0"/>
-              <a:t>30.06.2022</a:t>
+              <a:t>03.07.2022</a:t>
             </a:fld>
             <a:endParaRPr lang="de-DE"/>
           </a:p>
@@ -2509,7 +2509,7 @@
           <a:p>
             <a:fld id="{B5453A2F-AD27-4E66-90E5-CEA494DEF62A}" type="datetimeFigureOut">
               <a:rPr lang="de-DE" smtClean="0"/>
-              <a:t>30.06.2022</a:t>
+              <a:t>03.07.2022</a:t>
             </a:fld>
             <a:endParaRPr lang="de-DE"/>
           </a:p>
@@ -2722,7 +2722,7 @@
           <a:p>
             <a:fld id="{B5453A2F-AD27-4E66-90E5-CEA494DEF62A}" type="datetimeFigureOut">
               <a:rPr lang="de-DE" smtClean="0"/>
-              <a:t>30.06.2022</a:t>
+              <a:t>03.07.2022</a:t>
             </a:fld>
             <a:endParaRPr lang="de-DE"/>
           </a:p>
@@ -3571,15 +3571,7 @@
                   <a:schemeClr val="tx1"/>
                 </a:solidFill>
               </a:rPr>
-              <a:t>.</a:t>
-            </a:r>
-            <a:r>
-              <a:rPr lang="de-DE" sz="1100" dirty="0" smtClean="0">
-                <a:solidFill>
-                  <a:schemeClr val="tx1"/>
-                </a:solidFill>
-              </a:rPr>
-              <a:t>XML</a:t>
+              <a:t>.XML</a:t>
             </a:r>
             <a:br>
               <a:rPr lang="de-DE" sz="1100" dirty="0" smtClean="0">
@@ -4018,15 +4010,78 @@
                   <a:schemeClr val="tx1"/>
                 </a:solidFill>
               </a:rPr>
-              <a:t>StrcutureFile</a:t>
-            </a:r>
+              <a:t>StrcutureFileController</a:t>
+            </a:r>
+            <a:endParaRPr lang="de-DE" sz="1000" dirty="0">
+              <a:solidFill>
+                <a:schemeClr val="tx1"/>
+              </a:solidFill>
+            </a:endParaRPr>
+          </a:p>
+        </p:txBody>
+      </p:sp>
+      <p:sp>
+        <p:nvSpPr>
+          <p:cNvPr id="17" name="Rechteck 16"/>
+          <p:cNvSpPr/>
+          <p:nvPr/>
+        </p:nvSpPr>
+        <p:spPr>
+          <a:xfrm>
+            <a:off x="683568" y="1850922"/>
+            <a:ext cx="621142" cy="2297859"/>
+          </a:xfrm>
+          <a:prstGeom prst="rect">
+            <a:avLst/>
+          </a:prstGeom>
+          <a:solidFill>
+            <a:schemeClr val="accent5">
+              <a:lumMod val="60000"/>
+              <a:lumOff val="40000"/>
+            </a:schemeClr>
+          </a:solidFill>
+          <a:ln>
+            <a:solidFill>
+              <a:schemeClr val="tx1"/>
+            </a:solidFill>
+          </a:ln>
+        </p:spPr>
+        <p:style>
+          <a:lnRef idx="2">
+            <a:schemeClr val="accent1">
+              <a:shade val="50000"/>
+            </a:schemeClr>
+          </a:lnRef>
+          <a:fillRef idx="1">
+            <a:schemeClr val="accent1"/>
+          </a:fillRef>
+          <a:effectRef idx="0">
+            <a:schemeClr val="accent1"/>
+          </a:effectRef>
+          <a:fontRef idx="minor">
+            <a:schemeClr val="lt1"/>
+          </a:fontRef>
+        </p:style>
+        <p:txBody>
+          <a:bodyPr rtlCol="0" anchor="ctr"/>
+          <a:lstStyle/>
+          <a:p>
+            <a:pPr algn="ctr"/>
             <a:r>
               <a:rPr lang="de-DE" sz="1000" dirty="0" err="1" smtClean="0">
                 <a:solidFill>
                   <a:schemeClr val="tx1"/>
                 </a:solidFill>
               </a:rPr>
-              <a:t>Controller</a:t>
+              <a:t>Dependency</a:t>
+            </a:r>
+            <a:r>
+              <a:rPr lang="de-DE" sz="1000" dirty="0" smtClean="0">
+                <a:solidFill>
+                  <a:schemeClr val="tx1"/>
+                </a:solidFill>
+              </a:rPr>
+              <a:t> Manager</a:t>
             </a:r>
             <a:endParaRPr lang="de-DE" sz="1000" dirty="0">
               <a:solidFill>
@@ -4790,14 +4845,14 @@
       </p:grpSpPr>
       <p:sp>
         <p:nvSpPr>
-          <p:cNvPr id="21" name="Rechteck 20"/>
+          <p:cNvPr id="13" name="Rechteck 12"/>
           <p:cNvSpPr/>
           <p:nvPr/>
         </p:nvSpPr>
         <p:spPr>
           <a:xfrm>
-            <a:off x="674005" y="4234091"/>
-            <a:ext cx="7704856" cy="2168623"/>
+            <a:off x="4283968" y="4127320"/>
+            <a:ext cx="3654428" cy="1340263"/>
           </a:xfrm>
           <a:prstGeom prst="rect">
             <a:avLst/>
@@ -4833,13 +4888,45 @@
           <a:bodyPr rtlCol="0" anchor="t"/>
           <a:lstStyle/>
           <a:p>
+            <a:pPr algn="ctr"/>
+            <a:r>
+              <a:rPr lang="de-DE" sz="1000" dirty="0" smtClean="0">
+                <a:solidFill>
+                  <a:schemeClr val="tx1"/>
+                </a:solidFill>
+              </a:rPr>
+              <a:t>&lt;&lt; </a:t>
+            </a:r>
             <a:r>
               <a:rPr lang="de-DE" sz="1000" dirty="0" err="1" smtClean="0">
                 <a:solidFill>
                   <a:schemeClr val="tx1"/>
                 </a:solidFill>
               </a:rPr>
-              <a:t>LuceneAccess.Logic.Indexing</a:t>
+              <a:t>Component</a:t>
+            </a:r>
+            <a:r>
+              <a:rPr lang="de-DE" sz="1000" dirty="0" smtClean="0">
+                <a:solidFill>
+                  <a:schemeClr val="tx1"/>
+                </a:solidFill>
+              </a:rPr>
+              <a:t> &gt;&gt;</a:t>
+            </a:r>
+            <a:br>
+              <a:rPr lang="de-DE" sz="1000" dirty="0" smtClean="0">
+                <a:solidFill>
+                  <a:schemeClr val="tx1"/>
+                </a:solidFill>
+              </a:rPr>
+            </a:br>
+            <a:r>
+              <a:rPr lang="de-DE" sz="1000" dirty="0" err="1" smtClean="0">
+                <a:solidFill>
+                  <a:schemeClr val="tx1"/>
+                </a:solidFill>
+              </a:rPr>
+              <a:t>LuceneAccess</a:t>
             </a:r>
             <a:endParaRPr lang="de-DE" sz="1000" dirty="0">
               <a:solidFill>
@@ -4851,13 +4938,190 @@
       </p:sp>
       <p:grpSp>
         <p:nvGrpSpPr>
-          <p:cNvPr id="15" name="Gruppieren 14"/>
+          <p:cNvPr id="4" name="Gruppieren 3"/>
           <p:cNvGrpSpPr/>
           <p:nvPr/>
         </p:nvGrpSpPr>
         <p:grpSpPr>
           <a:xfrm>
-            <a:off x="6313787" y="5714032"/>
+            <a:off x="7452320" y="4271336"/>
+            <a:ext cx="288032" cy="384893"/>
+            <a:chOff x="7757733" y="1196753"/>
+            <a:chExt cx="414667" cy="648072"/>
+          </a:xfrm>
+        </p:grpSpPr>
+        <p:sp>
+          <p:nvSpPr>
+            <p:cNvPr id="14" name="Rechteck 13"/>
+            <p:cNvSpPr/>
+            <p:nvPr/>
+          </p:nvSpPr>
+          <p:spPr>
+            <a:xfrm>
+              <a:off x="7884368" y="1196753"/>
+              <a:ext cx="288032" cy="648072"/>
+            </a:xfrm>
+            <a:prstGeom prst="rect">
+              <a:avLst/>
+            </a:prstGeom>
+            <a:solidFill>
+              <a:schemeClr val="bg2">
+                <a:lumMod val="75000"/>
+              </a:schemeClr>
+            </a:solidFill>
+            <a:ln>
+              <a:solidFill>
+                <a:schemeClr val="tx1"/>
+              </a:solidFill>
+            </a:ln>
+          </p:spPr>
+          <p:style>
+            <a:lnRef idx="2">
+              <a:schemeClr val="accent1">
+                <a:shade val="50000"/>
+              </a:schemeClr>
+            </a:lnRef>
+            <a:fillRef idx="1">
+              <a:schemeClr val="accent1"/>
+            </a:fillRef>
+            <a:effectRef idx="0">
+              <a:schemeClr val="accent1"/>
+            </a:effectRef>
+            <a:fontRef idx="minor">
+              <a:schemeClr val="lt1"/>
+            </a:fontRef>
+          </p:style>
+          <p:txBody>
+            <a:bodyPr rtlCol="0" anchor="t"/>
+            <a:lstStyle/>
+            <a:p>
+              <a:pPr algn="ctr"/>
+              <a:endParaRPr lang="de-DE" sz="1000" dirty="0">
+                <a:solidFill>
+                  <a:schemeClr val="tx1"/>
+                </a:solidFill>
+              </a:endParaRPr>
+            </a:p>
+          </p:txBody>
+        </p:sp>
+        <p:sp>
+          <p:nvSpPr>
+            <p:cNvPr id="16" name="Rechteck 15"/>
+            <p:cNvSpPr/>
+            <p:nvPr/>
+          </p:nvSpPr>
+          <p:spPr>
+            <a:xfrm>
+              <a:off x="7757733" y="1329617"/>
+              <a:ext cx="253270" cy="144016"/>
+            </a:xfrm>
+            <a:prstGeom prst="rect">
+              <a:avLst/>
+            </a:prstGeom>
+            <a:solidFill>
+              <a:schemeClr val="bg2">
+                <a:lumMod val="75000"/>
+              </a:schemeClr>
+            </a:solidFill>
+            <a:ln>
+              <a:solidFill>
+                <a:schemeClr val="tx1"/>
+              </a:solidFill>
+            </a:ln>
+          </p:spPr>
+          <p:style>
+            <a:lnRef idx="2">
+              <a:schemeClr val="accent1">
+                <a:shade val="50000"/>
+              </a:schemeClr>
+            </a:lnRef>
+            <a:fillRef idx="1">
+              <a:schemeClr val="accent1"/>
+            </a:fillRef>
+            <a:effectRef idx="0">
+              <a:schemeClr val="accent1"/>
+            </a:effectRef>
+            <a:fontRef idx="minor">
+              <a:schemeClr val="lt1"/>
+            </a:fontRef>
+          </p:style>
+          <p:txBody>
+            <a:bodyPr rtlCol="0" anchor="t"/>
+            <a:lstStyle/>
+            <a:p>
+              <a:pPr algn="ctr"/>
+              <a:endParaRPr lang="de-DE" sz="1000" dirty="0">
+                <a:solidFill>
+                  <a:schemeClr val="tx1"/>
+                </a:solidFill>
+              </a:endParaRPr>
+            </a:p>
+          </p:txBody>
+        </p:sp>
+        <p:sp>
+          <p:nvSpPr>
+            <p:cNvPr id="17" name="Rechteck 16"/>
+            <p:cNvSpPr/>
+            <p:nvPr/>
+          </p:nvSpPr>
+          <p:spPr>
+            <a:xfrm>
+              <a:off x="7757733" y="1581646"/>
+              <a:ext cx="253270" cy="144016"/>
+            </a:xfrm>
+            <a:prstGeom prst="rect">
+              <a:avLst/>
+            </a:prstGeom>
+            <a:solidFill>
+              <a:schemeClr val="bg2">
+                <a:lumMod val="75000"/>
+              </a:schemeClr>
+            </a:solidFill>
+            <a:ln>
+              <a:solidFill>
+                <a:schemeClr val="tx1"/>
+              </a:solidFill>
+            </a:ln>
+          </p:spPr>
+          <p:style>
+            <a:lnRef idx="2">
+              <a:schemeClr val="accent1">
+                <a:shade val="50000"/>
+              </a:schemeClr>
+            </a:lnRef>
+            <a:fillRef idx="1">
+              <a:schemeClr val="accent1"/>
+            </a:fillRef>
+            <a:effectRef idx="0">
+              <a:schemeClr val="accent1"/>
+            </a:effectRef>
+            <a:fontRef idx="minor">
+              <a:schemeClr val="lt1"/>
+            </a:fontRef>
+          </p:style>
+          <p:txBody>
+            <a:bodyPr rtlCol="0" anchor="t"/>
+            <a:lstStyle/>
+            <a:p>
+              <a:pPr algn="ctr"/>
+              <a:endParaRPr lang="de-DE" sz="1000" dirty="0">
+                <a:solidFill>
+                  <a:schemeClr val="tx1"/>
+                </a:solidFill>
+              </a:endParaRPr>
+            </a:p>
+          </p:txBody>
+        </p:sp>
+      </p:grpSp>
+      <p:grpSp>
+        <p:nvGrpSpPr>
+          <p:cNvPr id="18" name="Gruppieren 17"/>
+          <p:cNvGrpSpPr/>
+          <p:nvPr/>
+        </p:nvGrpSpPr>
+        <p:grpSpPr>
+          <a:xfrm rot="16200000">
+            <a:off x="7014355" y="3856738"/>
             <a:ext cx="386970" cy="154195"/>
             <a:chOff x="1304710" y="2132856"/>
             <a:chExt cx="386970" cy="154195"/>
@@ -4865,7 +5129,7 @@
         </p:grpSpPr>
         <p:cxnSp>
           <p:nvCxnSpPr>
-            <p:cNvPr id="3" name="Gerade Verbindung 2"/>
+            <p:cNvPr id="19" name="Gerade Verbindung 18"/>
             <p:cNvCxnSpPr/>
             <p:nvPr/>
           </p:nvCxnSpPr>
@@ -4900,7 +5164,7 @@
         </p:cxnSp>
         <p:sp>
           <p:nvSpPr>
-            <p:cNvPr id="12" name="Ellipse 11"/>
+            <p:cNvPr id="20" name="Ellipse 19"/>
             <p:cNvSpPr/>
             <p:nvPr/>
           </p:nvSpPr>
@@ -4945,15 +5209,259 @@
           </p:txBody>
         </p:sp>
       </p:grpSp>
+      <p:sp>
+        <p:nvSpPr>
+          <p:cNvPr id="24" name="Rechteck 23"/>
+          <p:cNvSpPr/>
+          <p:nvPr/>
+        </p:nvSpPr>
+        <p:spPr>
+          <a:xfrm>
+            <a:off x="4283969" y="2020063"/>
+            <a:ext cx="3654428" cy="1368152"/>
+          </a:xfrm>
+          <a:prstGeom prst="rect">
+            <a:avLst/>
+          </a:prstGeom>
+          <a:solidFill>
+            <a:srgbClr val="FFC000"/>
+          </a:solidFill>
+          <a:ln>
+            <a:solidFill>
+              <a:schemeClr val="tx1"/>
+            </a:solidFill>
+          </a:ln>
+        </p:spPr>
+        <p:style>
+          <a:lnRef idx="2">
+            <a:schemeClr val="accent1">
+              <a:shade val="50000"/>
+            </a:schemeClr>
+          </a:lnRef>
+          <a:fillRef idx="1">
+            <a:schemeClr val="accent1"/>
+          </a:fillRef>
+          <a:effectRef idx="0">
+            <a:schemeClr val="accent1"/>
+          </a:effectRef>
+          <a:fontRef idx="minor">
+            <a:schemeClr val="lt1"/>
+          </a:fontRef>
+        </p:style>
+        <p:txBody>
+          <a:bodyPr rtlCol="0" anchor="t"/>
+          <a:lstStyle/>
+          <a:p>
+            <a:pPr algn="ctr"/>
+            <a:r>
+              <a:rPr lang="de-DE" sz="1000" dirty="0" smtClean="0">
+                <a:solidFill>
+                  <a:schemeClr val="tx1"/>
+                </a:solidFill>
+              </a:rPr>
+              <a:t>&lt;&lt; </a:t>
+            </a:r>
+            <a:r>
+              <a:rPr lang="de-DE" sz="1000" dirty="0" err="1" smtClean="0">
+                <a:solidFill>
+                  <a:schemeClr val="tx1"/>
+                </a:solidFill>
+              </a:rPr>
+              <a:t>AccessManager</a:t>
+            </a:r>
+            <a:r>
+              <a:rPr lang="de-DE" sz="1000" dirty="0" smtClean="0">
+                <a:solidFill>
+                  <a:schemeClr val="tx1"/>
+                </a:solidFill>
+              </a:rPr>
+              <a:t> &gt;&gt;</a:t>
+            </a:r>
+            <a:endParaRPr lang="de-DE" sz="1000" dirty="0">
+              <a:solidFill>
+                <a:schemeClr val="tx1"/>
+              </a:solidFill>
+            </a:endParaRPr>
+          </a:p>
+        </p:txBody>
+      </p:sp>
+      <p:grpSp>
+        <p:nvGrpSpPr>
+          <p:cNvPr id="25" name="Gruppieren 24"/>
+          <p:cNvGrpSpPr/>
+          <p:nvPr/>
+        </p:nvGrpSpPr>
+        <p:grpSpPr>
+          <a:xfrm>
+            <a:off x="7540282" y="2129163"/>
+            <a:ext cx="288032" cy="384893"/>
+            <a:chOff x="7757733" y="1196753"/>
+            <a:chExt cx="414667" cy="648072"/>
+          </a:xfrm>
+          <a:solidFill>
+            <a:srgbClr val="FFC000"/>
+          </a:solidFill>
+        </p:grpSpPr>
+        <p:sp>
+          <p:nvSpPr>
+            <p:cNvPr id="27" name="Rechteck 26"/>
+            <p:cNvSpPr/>
+            <p:nvPr/>
+          </p:nvSpPr>
+          <p:spPr>
+            <a:xfrm>
+              <a:off x="7884368" y="1196753"/>
+              <a:ext cx="288032" cy="648072"/>
+            </a:xfrm>
+            <a:prstGeom prst="rect">
+              <a:avLst/>
+            </a:prstGeom>
+            <a:grpFill/>
+            <a:ln>
+              <a:solidFill>
+                <a:schemeClr val="tx1"/>
+              </a:solidFill>
+            </a:ln>
+          </p:spPr>
+          <p:style>
+            <a:lnRef idx="2">
+              <a:schemeClr val="accent1">
+                <a:shade val="50000"/>
+              </a:schemeClr>
+            </a:lnRef>
+            <a:fillRef idx="1">
+              <a:schemeClr val="accent1"/>
+            </a:fillRef>
+            <a:effectRef idx="0">
+              <a:schemeClr val="accent1"/>
+            </a:effectRef>
+            <a:fontRef idx="minor">
+              <a:schemeClr val="lt1"/>
+            </a:fontRef>
+          </p:style>
+          <p:txBody>
+            <a:bodyPr rtlCol="0" anchor="t"/>
+            <a:lstStyle/>
+            <a:p>
+              <a:pPr algn="ctr"/>
+              <a:endParaRPr lang="de-DE" sz="1000" dirty="0">
+                <a:solidFill>
+                  <a:schemeClr val="tx1"/>
+                </a:solidFill>
+              </a:endParaRPr>
+            </a:p>
+          </p:txBody>
+        </p:sp>
+        <p:sp>
+          <p:nvSpPr>
+            <p:cNvPr id="29" name="Rechteck 28"/>
+            <p:cNvSpPr/>
+            <p:nvPr/>
+          </p:nvSpPr>
+          <p:spPr>
+            <a:xfrm>
+              <a:off x="7757733" y="1329617"/>
+              <a:ext cx="253270" cy="144016"/>
+            </a:xfrm>
+            <a:prstGeom prst="rect">
+              <a:avLst/>
+            </a:prstGeom>
+            <a:grpFill/>
+            <a:ln>
+              <a:solidFill>
+                <a:schemeClr val="tx1"/>
+              </a:solidFill>
+            </a:ln>
+          </p:spPr>
+          <p:style>
+            <a:lnRef idx="2">
+              <a:schemeClr val="accent1">
+                <a:shade val="50000"/>
+              </a:schemeClr>
+            </a:lnRef>
+            <a:fillRef idx="1">
+              <a:schemeClr val="accent1"/>
+            </a:fillRef>
+            <a:effectRef idx="0">
+              <a:schemeClr val="accent1"/>
+            </a:effectRef>
+            <a:fontRef idx="minor">
+              <a:schemeClr val="lt1"/>
+            </a:fontRef>
+          </p:style>
+          <p:txBody>
+            <a:bodyPr rtlCol="0" anchor="t"/>
+            <a:lstStyle/>
+            <a:p>
+              <a:pPr algn="ctr"/>
+              <a:endParaRPr lang="de-DE" sz="1000" dirty="0">
+                <a:solidFill>
+                  <a:schemeClr val="tx1"/>
+                </a:solidFill>
+              </a:endParaRPr>
+            </a:p>
+          </p:txBody>
+        </p:sp>
+        <p:sp>
+          <p:nvSpPr>
+            <p:cNvPr id="30" name="Rechteck 29"/>
+            <p:cNvSpPr/>
+            <p:nvPr/>
+          </p:nvSpPr>
+          <p:spPr>
+            <a:xfrm>
+              <a:off x="7757733" y="1581646"/>
+              <a:ext cx="253270" cy="144016"/>
+            </a:xfrm>
+            <a:prstGeom prst="rect">
+              <a:avLst/>
+            </a:prstGeom>
+            <a:grpFill/>
+            <a:ln>
+              <a:solidFill>
+                <a:schemeClr val="tx1"/>
+              </a:solidFill>
+            </a:ln>
+          </p:spPr>
+          <p:style>
+            <a:lnRef idx="2">
+              <a:schemeClr val="accent1">
+                <a:shade val="50000"/>
+              </a:schemeClr>
+            </a:lnRef>
+            <a:fillRef idx="1">
+              <a:schemeClr val="accent1"/>
+            </a:fillRef>
+            <a:effectRef idx="0">
+              <a:schemeClr val="accent1"/>
+            </a:effectRef>
+            <a:fontRef idx="minor">
+              <a:schemeClr val="lt1"/>
+            </a:fontRef>
+          </p:style>
+          <p:txBody>
+            <a:bodyPr rtlCol="0" anchor="t"/>
+            <a:lstStyle/>
+            <a:p>
+              <a:pPr algn="ctr"/>
+              <a:endParaRPr lang="de-DE" sz="1000" dirty="0">
+                <a:solidFill>
+                  <a:schemeClr val="tx1"/>
+                </a:solidFill>
+              </a:endParaRPr>
+            </a:p>
+          </p:txBody>
+        </p:sp>
+      </p:grpSp>
       <p:cxnSp>
         <p:nvCxnSpPr>
-          <p:cNvPr id="26" name="Gerade Verbindung 25"/>
+          <p:cNvPr id="32" name="Gerade Verbindung 31"/>
           <p:cNvCxnSpPr/>
           <p:nvPr/>
         </p:nvCxnSpPr>
         <p:spPr>
-          <a:xfrm>
-            <a:off x="6313787" y="4976791"/>
+          <a:xfrm rot="16200000">
+            <a:off x="7086363" y="3509693"/>
             <a:ext cx="242954" cy="0"/>
           </a:xfrm>
           <a:prstGeom prst="line">
@@ -4982,286 +5490,14 @@
       </p:cxnSp>
       <p:sp>
         <p:nvSpPr>
-          <p:cNvPr id="28" name="Textfeld 27"/>
-          <p:cNvSpPr txBox="1"/>
+          <p:cNvPr id="5" name="Halbbogen 4"/>
+          <p:cNvSpPr/>
           <p:nvPr/>
         </p:nvSpPr>
         <p:spPr>
           <a:xfrm>
-            <a:off x="6733308" y="4853680"/>
-            <a:ext cx="681597" cy="246221"/>
-          </a:xfrm>
-          <a:prstGeom prst="rect">
-            <a:avLst/>
-          </a:prstGeom>
-          <a:noFill/>
-        </p:spPr>
-        <p:txBody>
-          <a:bodyPr wrap="none" rtlCol="0">
-            <a:spAutoFit/>
-          </a:bodyPr>
-          <a:lstStyle/>
-          <a:p>
-            <a:r>
-              <a:rPr lang="de-DE" sz="1000" dirty="0" err="1" smtClean="0"/>
-              <a:t>ILoggable</a:t>
-            </a:r>
-            <a:endParaRPr lang="de-DE" sz="1000" dirty="0"/>
-          </a:p>
-        </p:txBody>
-      </p:sp>
-      <p:sp>
-        <p:nvSpPr>
-          <p:cNvPr id="22" name="Rechteck 21"/>
-          <p:cNvSpPr/>
-          <p:nvPr/>
-        </p:nvSpPr>
-        <p:spPr>
-          <a:xfrm>
-            <a:off x="890029" y="4627126"/>
-            <a:ext cx="3768805" cy="1512168"/>
-          </a:xfrm>
-          <a:prstGeom prst="rect">
-            <a:avLst/>
-          </a:prstGeom>
-          <a:solidFill>
-            <a:schemeClr val="bg1"/>
-          </a:solidFill>
-          <a:ln>
-            <a:solidFill>
-              <a:schemeClr val="tx1"/>
-            </a:solidFill>
-          </a:ln>
-        </p:spPr>
-        <p:style>
-          <a:lnRef idx="2">
-            <a:schemeClr val="accent1">
-              <a:shade val="50000"/>
-            </a:schemeClr>
-          </a:lnRef>
-          <a:fillRef idx="1">
-            <a:schemeClr val="accent1"/>
-          </a:fillRef>
-          <a:effectRef idx="0">
-            <a:schemeClr val="accent1"/>
-          </a:effectRef>
-          <a:fontRef idx="minor">
-            <a:schemeClr val="lt1"/>
-          </a:fontRef>
-        </p:style>
-        <p:txBody>
-          <a:bodyPr rtlCol="0" anchor="t"/>
-          <a:lstStyle/>
-          <a:p>
-            <a:r>
-              <a:rPr lang="de-DE" sz="1000" dirty="0" err="1" smtClean="0">
-                <a:solidFill>
-                  <a:schemeClr val="tx1"/>
-                </a:solidFill>
-              </a:rPr>
-              <a:t>ILuceneIndexAccess</a:t>
-            </a:r>
-            <a:endParaRPr lang="de-DE" sz="1000" dirty="0" smtClean="0">
-              <a:solidFill>
-                <a:schemeClr val="tx1"/>
-              </a:solidFill>
-            </a:endParaRPr>
-          </a:p>
-          <a:p>
-            <a:endParaRPr lang="de-DE" sz="1000" dirty="0" smtClean="0">
-              <a:solidFill>
-                <a:schemeClr val="tx1"/>
-              </a:solidFill>
-            </a:endParaRPr>
-          </a:p>
-          <a:p>
-            <a:r>
-              <a:rPr lang="de-DE" sz="1000" dirty="0" smtClean="0">
-                <a:solidFill>
-                  <a:schemeClr val="tx1"/>
-                </a:solidFill>
-              </a:rPr>
-              <a:t>String </a:t>
-            </a:r>
-            <a:r>
-              <a:rPr lang="de-DE" sz="1000" dirty="0" err="1" smtClean="0">
-                <a:solidFill>
-                  <a:schemeClr val="tx1"/>
-                </a:solidFill>
-              </a:rPr>
-              <a:t>ParentTargetPathForImportedDocuments</a:t>
-            </a:r>
-            <a:r>
-              <a:rPr lang="de-DE" sz="1000" dirty="0" smtClean="0">
-                <a:solidFill>
-                  <a:schemeClr val="tx1"/>
-                </a:solidFill>
-              </a:rPr>
-              <a:t>=„“</a:t>
-            </a:r>
-          </a:p>
-          <a:p>
-            <a:endParaRPr lang="de-DE" sz="1000" dirty="0">
-              <a:solidFill>
-                <a:schemeClr val="tx1"/>
-              </a:solidFill>
-            </a:endParaRPr>
-          </a:p>
-          <a:p>
-            <a:endParaRPr lang="de-DE" sz="1000" dirty="0" smtClean="0">
-              <a:solidFill>
-                <a:schemeClr val="tx1"/>
-              </a:solidFill>
-            </a:endParaRPr>
-          </a:p>
-          <a:p>
-            <a:r>
-              <a:rPr lang="de-DE" sz="1000" dirty="0" err="1" smtClean="0">
-                <a:solidFill>
-                  <a:schemeClr val="tx1"/>
-                </a:solidFill>
-              </a:rPr>
-              <a:t>AddToIndex</a:t>
-            </a:r>
-            <a:r>
-              <a:rPr lang="de-DE" sz="1000" dirty="0" smtClean="0">
-                <a:solidFill>
-                  <a:schemeClr val="tx1"/>
-                </a:solidFill>
-              </a:rPr>
-              <a:t>(</a:t>
-            </a:r>
-            <a:r>
-              <a:rPr lang="de-DE" sz="1000" dirty="0" err="1" smtClean="0">
-                <a:solidFill>
-                  <a:schemeClr val="tx1"/>
-                </a:solidFill>
-              </a:rPr>
-              <a:t>IndexFolder</a:t>
-            </a:r>
-            <a:r>
-              <a:rPr lang="de-DE" sz="1000" dirty="0" smtClean="0">
-                <a:solidFill>
-                  <a:schemeClr val="tx1"/>
-                </a:solidFill>
-              </a:rPr>
-              <a:t>, Filename)</a:t>
-            </a:r>
-            <a:r>
-              <a:rPr lang="de-DE" sz="1000" dirty="0">
-                <a:solidFill>
-                  <a:schemeClr val="tx1"/>
-                </a:solidFill>
-              </a:rPr>
-              <a:t/>
-            </a:r>
-            <a:br>
-              <a:rPr lang="de-DE" sz="1000" dirty="0">
-                <a:solidFill>
-                  <a:schemeClr val="tx1"/>
-                </a:solidFill>
-              </a:rPr>
-            </a:br>
-            <a:r>
-              <a:rPr lang="de-DE" sz="1000" dirty="0" err="1" smtClean="0">
-                <a:solidFill>
-                  <a:schemeClr val="tx1"/>
-                </a:solidFill>
-              </a:rPr>
-              <a:t>AddToIndex</a:t>
-            </a:r>
-            <a:r>
-              <a:rPr lang="de-DE" sz="1000" dirty="0" smtClean="0">
-                <a:solidFill>
-                  <a:schemeClr val="tx1"/>
-                </a:solidFill>
-              </a:rPr>
-              <a:t>(</a:t>
-            </a:r>
-            <a:r>
-              <a:rPr lang="de-DE" sz="1000" dirty="0" err="1">
-                <a:solidFill>
-                  <a:schemeClr val="tx1"/>
-                </a:solidFill>
-              </a:rPr>
-              <a:t>IndexFolder</a:t>
-            </a:r>
-            <a:r>
-              <a:rPr lang="de-DE" sz="1000" dirty="0" smtClean="0">
-                <a:solidFill>
-                  <a:schemeClr val="tx1"/>
-                </a:solidFill>
-              </a:rPr>
-              <a:t>, Filenames)</a:t>
-            </a:r>
-          </a:p>
-          <a:p>
-            <a:r>
-              <a:rPr lang="de-DE" sz="1000" dirty="0" err="1" smtClean="0">
-                <a:solidFill>
-                  <a:schemeClr val="tx1"/>
-                </a:solidFill>
-              </a:rPr>
-              <a:t>AddToIndex</a:t>
-            </a:r>
-            <a:r>
-              <a:rPr lang="de-DE" sz="1000" dirty="0" smtClean="0">
-                <a:solidFill>
-                  <a:schemeClr val="tx1"/>
-                </a:solidFill>
-              </a:rPr>
-              <a:t>(</a:t>
-            </a:r>
-            <a:r>
-              <a:rPr lang="de-DE" sz="1000" dirty="0" err="1">
-                <a:solidFill>
-                  <a:schemeClr val="tx1"/>
-                </a:solidFill>
-              </a:rPr>
-              <a:t>IndexFolder</a:t>
-            </a:r>
-            <a:r>
-              <a:rPr lang="de-DE" sz="1000" dirty="0" smtClean="0">
-                <a:solidFill>
-                  <a:schemeClr val="tx1"/>
-                </a:solidFill>
-              </a:rPr>
-              <a:t>, </a:t>
-            </a:r>
-            <a:r>
-              <a:rPr lang="de-DE" sz="1000" dirty="0" err="1" smtClean="0">
-                <a:solidFill>
-                  <a:schemeClr val="tx1"/>
-                </a:solidFill>
-              </a:rPr>
-              <a:t>Foldername,withSubFolders</a:t>
-            </a:r>
-            <a:r>
-              <a:rPr lang="de-DE" sz="1000" dirty="0" smtClean="0">
-                <a:solidFill>
-                  <a:schemeClr val="tx1"/>
-                </a:solidFill>
-              </a:rPr>
-              <a:t>)</a:t>
-            </a:r>
-            <a:endParaRPr lang="de-DE" sz="1000" dirty="0">
-              <a:solidFill>
-                <a:schemeClr val="tx1"/>
-              </a:solidFill>
-            </a:endParaRPr>
-          </a:p>
-        </p:txBody>
-      </p:sp>
-      <p:sp>
-        <p:nvSpPr>
-          <p:cNvPr id="2" name="Halbbogen 1"/>
-          <p:cNvSpPr/>
-          <p:nvPr/>
-        </p:nvSpPr>
-        <p:spPr>
-          <a:xfrm rot="16200000">
-            <a:off x="6562409" y="4863110"/>
-            <a:ext cx="216024" cy="227361"/>
+            <a:off x="7027820" y="3631170"/>
+            <a:ext cx="360040" cy="360040"/>
           </a:xfrm>
           <a:prstGeom prst="blockArc">
             <a:avLst/>
@@ -5306,75 +5542,14 @@
       </p:sp>
       <p:sp>
         <p:nvSpPr>
-          <p:cNvPr id="23" name="Rechteck 22"/>
-          <p:cNvSpPr/>
+          <p:cNvPr id="34" name="Textfeld 33"/>
+          <p:cNvSpPr txBox="1"/>
           <p:nvPr/>
         </p:nvSpPr>
         <p:spPr>
           <a:xfrm>
-            <a:off x="4992603" y="4626128"/>
-            <a:ext cx="1308212" cy="1480172"/>
-          </a:xfrm>
-          <a:prstGeom prst="rect">
-            <a:avLst/>
-          </a:prstGeom>
-          <a:solidFill>
-            <a:schemeClr val="bg2">
-              <a:lumMod val="75000"/>
-            </a:schemeClr>
-          </a:solidFill>
-          <a:ln>
-            <a:solidFill>
-              <a:schemeClr val="tx1"/>
-            </a:solidFill>
-          </a:ln>
-        </p:spPr>
-        <p:style>
-          <a:lnRef idx="2">
-            <a:schemeClr val="accent1">
-              <a:shade val="50000"/>
-            </a:schemeClr>
-          </a:lnRef>
-          <a:fillRef idx="1">
-            <a:schemeClr val="accent1"/>
-          </a:fillRef>
-          <a:effectRef idx="0">
-            <a:schemeClr val="accent1"/>
-          </a:effectRef>
-          <a:fontRef idx="minor">
-            <a:schemeClr val="lt1"/>
-          </a:fontRef>
-        </p:style>
-        <p:txBody>
-          <a:bodyPr rtlCol="0" anchor="t"/>
-          <a:lstStyle/>
-          <a:p>
-            <a:r>
-              <a:rPr lang="de-DE" sz="1000" dirty="0" err="1" smtClean="0">
-                <a:solidFill>
-                  <a:schemeClr val="tx1"/>
-                </a:solidFill>
-              </a:rPr>
-              <a:t>IndexingController</a:t>
-            </a:r>
-            <a:endParaRPr lang="de-DE" sz="1000" dirty="0">
-              <a:solidFill>
-                <a:schemeClr val="tx1"/>
-              </a:solidFill>
-            </a:endParaRPr>
-          </a:p>
-        </p:txBody>
-      </p:sp>
-      <p:sp>
-        <p:nvSpPr>
-          <p:cNvPr id="11" name="Textfeld 10"/>
-          <p:cNvSpPr txBox="1"/>
-          <p:nvPr/>
-        </p:nvSpPr>
-        <p:spPr>
-          <a:xfrm>
-            <a:off x="6733308" y="5668018"/>
-            <a:ext cx="1221809" cy="246221"/>
+            <a:off x="7379217" y="3744035"/>
+            <a:ext cx="1042273" cy="400110"/>
           </a:xfrm>
           <a:prstGeom prst="rect">
             <a:avLst/>
@@ -5389,74 +5564,20 @@
           <a:p>
             <a:r>
               <a:rPr lang="de-DE" sz="1000" dirty="0" err="1" smtClean="0"/>
-              <a:t>I</a:t>
-            </a:r>
+              <a:t>IDataStoring</a:t>
+            </a:r>
+            <a:r>
+              <a:rPr lang="de-DE" sz="1000" dirty="0" smtClean="0"/>
+              <a:t/>
+            </a:r>
+            <a:br>
+              <a:rPr lang="de-DE" sz="1000" dirty="0" smtClean="0"/>
+            </a:br>
             <a:r>
               <a:rPr lang="de-DE" sz="1000" dirty="0" err="1" smtClean="0"/>
-              <a:t>IndexingController</a:t>
+              <a:t>IDataRequesting</a:t>
             </a:r>
             <a:endParaRPr lang="de-DE" sz="1000" dirty="0"/>
-          </a:p>
-        </p:txBody>
-      </p:sp>
-      <p:sp>
-        <p:nvSpPr>
-          <p:cNvPr id="13" name="Rechteck 12"/>
-          <p:cNvSpPr/>
-          <p:nvPr/>
-        </p:nvSpPr>
-        <p:spPr>
-          <a:xfrm>
-            <a:off x="701548" y="1124744"/>
-            <a:ext cx="7704856" cy="2168623"/>
-          </a:xfrm>
-          <a:prstGeom prst="rect">
-            <a:avLst/>
-          </a:prstGeom>
-          <a:solidFill>
-            <a:schemeClr val="bg2">
-              <a:lumMod val="75000"/>
-            </a:schemeClr>
-          </a:solidFill>
-          <a:ln>
-            <a:solidFill>
-              <a:schemeClr val="tx1"/>
-            </a:solidFill>
-          </a:ln>
-        </p:spPr>
-        <p:style>
-          <a:lnRef idx="2">
-            <a:schemeClr val="accent1">
-              <a:shade val="50000"/>
-            </a:schemeClr>
-          </a:lnRef>
-          <a:fillRef idx="1">
-            <a:schemeClr val="accent1"/>
-          </a:fillRef>
-          <a:effectRef idx="0">
-            <a:schemeClr val="accent1"/>
-          </a:effectRef>
-          <a:fontRef idx="minor">
-            <a:schemeClr val="lt1"/>
-          </a:fontRef>
-        </p:style>
-        <p:txBody>
-          <a:bodyPr rtlCol="0" anchor="t"/>
-          <a:lstStyle/>
-          <a:p>
-            <a:r>
-              <a:rPr lang="de-DE" sz="1000" dirty="0" err="1" smtClean="0">
-                <a:solidFill>
-                  <a:schemeClr val="tx1"/>
-                </a:solidFill>
-              </a:rPr>
-              <a:t>LuceneAccess.Logic.Indexing</a:t>
-            </a:r>
-            <a:endParaRPr lang="de-DE" sz="1000" dirty="0">
-              <a:solidFill>
-                <a:schemeClr val="tx1"/>
-              </a:solidFill>
-            </a:endParaRPr>
           </a:p>
         </p:txBody>
       </p:sp>

</xml_diff>

<commit_message>
Added DocumentAccessing IDocumentStoring und IDocumentRequesting interface
</commit_message>
<xml_diff>
--- a/documentation/Architecture_v0.1.0.pptx
+++ b/documentation/Architecture_v0.1.0.pptx
@@ -4261,8 +4261,8 @@
         </p:nvSpPr>
         <p:spPr>
           <a:xfrm>
-            <a:off x="3387713" y="4957773"/>
-            <a:ext cx="1234159" cy="576064"/>
+            <a:off x="3387713" y="4333287"/>
+            <a:ext cx="1234159" cy="1200550"/>
           </a:xfrm>
           <a:prstGeom prst="rect">
             <a:avLst/>
@@ -4450,8 +4450,8 @@
         </p:nvSpPr>
         <p:spPr>
           <a:xfrm>
-            <a:off x="4684669" y="4966439"/>
-            <a:ext cx="1092827" cy="576064"/>
+            <a:off x="4684669" y="4333287"/>
+            <a:ext cx="1092827" cy="1209216"/>
           </a:xfrm>
           <a:prstGeom prst="rect">
             <a:avLst/>
@@ -4493,66 +4493,6 @@
                 </a:solidFill>
               </a:rPr>
               <a:t>QueryController</a:t>
-            </a:r>
-            <a:endParaRPr lang="de-DE" sz="1000" dirty="0">
-              <a:solidFill>
-                <a:schemeClr val="tx1"/>
-              </a:solidFill>
-            </a:endParaRPr>
-          </a:p>
-        </p:txBody>
-      </p:sp>
-      <p:sp>
-        <p:nvSpPr>
-          <p:cNvPr id="20" name="Rechteck 19"/>
-          <p:cNvSpPr/>
-          <p:nvPr/>
-        </p:nvSpPr>
-        <p:spPr>
-          <a:xfrm>
-            <a:off x="3380171" y="4341152"/>
-            <a:ext cx="2397325" cy="576064"/>
-          </a:xfrm>
-          <a:prstGeom prst="rect">
-            <a:avLst/>
-          </a:prstGeom>
-          <a:solidFill>
-            <a:schemeClr val="bg1"/>
-          </a:solidFill>
-          <a:ln>
-            <a:solidFill>
-              <a:schemeClr val="tx1"/>
-            </a:solidFill>
-          </a:ln>
-        </p:spPr>
-        <p:style>
-          <a:lnRef idx="2">
-            <a:schemeClr val="accent1">
-              <a:shade val="50000"/>
-            </a:schemeClr>
-          </a:lnRef>
-          <a:fillRef idx="1">
-            <a:schemeClr val="accent1"/>
-          </a:fillRef>
-          <a:effectRef idx="0">
-            <a:schemeClr val="accent1"/>
-          </a:effectRef>
-          <a:fontRef idx="minor">
-            <a:schemeClr val="lt1"/>
-          </a:fontRef>
-        </p:style>
-        <p:txBody>
-          <a:bodyPr rtlCol="0" anchor="ctr"/>
-          <a:lstStyle/>
-          <a:p>
-            <a:pPr algn="ctr"/>
-            <a:r>
-              <a:rPr lang="de-DE" sz="1000" dirty="0" err="1" smtClean="0">
-                <a:solidFill>
-                  <a:schemeClr val="tx1"/>
-                </a:solidFill>
-              </a:rPr>
-              <a:t>LuceneAccessController</a:t>
             </a:r>
             <a:endParaRPr lang="de-DE" sz="1000" dirty="0">
               <a:solidFill>

</xml_diff>

<commit_message>
changed ImportController into StoringController
</commit_message>
<xml_diff>
--- a/documentation/Architecture_v0.1.0.pptx
+++ b/documentation/Architecture_v0.1.0.pptx
@@ -4238,12 +4238,20 @@
           <a:p>
             <a:pPr algn="ctr"/>
             <a:r>
-              <a:rPr lang="de-DE" sz="1000" dirty="0" err="1" smtClean="0">
+              <a:rPr lang="de-DE" sz="1000" smtClean="0">
                 <a:solidFill>
                   <a:schemeClr val="tx1"/>
                 </a:solidFill>
               </a:rPr>
-              <a:t>ImportController</a:t>
+              <a:t>Storing</a:t>
+            </a:r>
+            <a:r>
+              <a:rPr lang="de-DE" sz="1000" smtClean="0">
+                <a:solidFill>
+                  <a:schemeClr val="tx1"/>
+                </a:solidFill>
+              </a:rPr>
+              <a:t>Controller</a:t>
             </a:r>
             <a:endParaRPr lang="de-DE" sz="1000" dirty="0">
               <a:solidFill>

</xml_diff>

<commit_message>
StoringForuser Interafec and tests implemented
</commit_message>
<xml_diff>
--- a/documentation/Architecture_v0.1.0.pptx
+++ b/documentation/Architecture_v0.1.0.pptx
@@ -291,7 +291,7 @@
           <a:p>
             <a:fld id="{B5453A2F-AD27-4E66-90E5-CEA494DEF62A}" type="datetimeFigureOut">
               <a:rPr lang="de-DE" smtClean="0"/>
-              <a:t>06.07.2022</a:t>
+              <a:t>07.07.2022</a:t>
             </a:fld>
             <a:endParaRPr lang="de-DE"/>
           </a:p>
@@ -461,7 +461,7 @@
           <a:p>
             <a:fld id="{B5453A2F-AD27-4E66-90E5-CEA494DEF62A}" type="datetimeFigureOut">
               <a:rPr lang="de-DE" smtClean="0"/>
-              <a:t>06.07.2022</a:t>
+              <a:t>07.07.2022</a:t>
             </a:fld>
             <a:endParaRPr lang="de-DE"/>
           </a:p>
@@ -641,7 +641,7 @@
           <a:p>
             <a:fld id="{B5453A2F-AD27-4E66-90E5-CEA494DEF62A}" type="datetimeFigureOut">
               <a:rPr lang="de-DE" smtClean="0"/>
-              <a:t>06.07.2022</a:t>
+              <a:t>07.07.2022</a:t>
             </a:fld>
             <a:endParaRPr lang="de-DE"/>
           </a:p>
@@ -811,7 +811,7 @@
           <a:p>
             <a:fld id="{B5453A2F-AD27-4E66-90E5-CEA494DEF62A}" type="datetimeFigureOut">
               <a:rPr lang="de-DE" smtClean="0"/>
-              <a:t>06.07.2022</a:t>
+              <a:t>07.07.2022</a:t>
             </a:fld>
             <a:endParaRPr lang="de-DE"/>
           </a:p>
@@ -1057,7 +1057,7 @@
           <a:p>
             <a:fld id="{B5453A2F-AD27-4E66-90E5-CEA494DEF62A}" type="datetimeFigureOut">
               <a:rPr lang="de-DE" smtClean="0"/>
-              <a:t>06.07.2022</a:t>
+              <a:t>07.07.2022</a:t>
             </a:fld>
             <a:endParaRPr lang="de-DE"/>
           </a:p>
@@ -1345,7 +1345,7 @@
           <a:p>
             <a:fld id="{B5453A2F-AD27-4E66-90E5-CEA494DEF62A}" type="datetimeFigureOut">
               <a:rPr lang="de-DE" smtClean="0"/>
-              <a:t>06.07.2022</a:t>
+              <a:t>07.07.2022</a:t>
             </a:fld>
             <a:endParaRPr lang="de-DE"/>
           </a:p>
@@ -1767,7 +1767,7 @@
           <a:p>
             <a:fld id="{B5453A2F-AD27-4E66-90E5-CEA494DEF62A}" type="datetimeFigureOut">
               <a:rPr lang="de-DE" smtClean="0"/>
-              <a:t>06.07.2022</a:t>
+              <a:t>07.07.2022</a:t>
             </a:fld>
             <a:endParaRPr lang="de-DE"/>
           </a:p>
@@ -1885,7 +1885,7 @@
           <a:p>
             <a:fld id="{B5453A2F-AD27-4E66-90E5-CEA494DEF62A}" type="datetimeFigureOut">
               <a:rPr lang="de-DE" smtClean="0"/>
-              <a:t>06.07.2022</a:t>
+              <a:t>07.07.2022</a:t>
             </a:fld>
             <a:endParaRPr lang="de-DE"/>
           </a:p>
@@ -1980,7 +1980,7 @@
           <a:p>
             <a:fld id="{B5453A2F-AD27-4E66-90E5-CEA494DEF62A}" type="datetimeFigureOut">
               <a:rPr lang="de-DE" smtClean="0"/>
-              <a:t>06.07.2022</a:t>
+              <a:t>07.07.2022</a:t>
             </a:fld>
             <a:endParaRPr lang="de-DE"/>
           </a:p>
@@ -2257,7 +2257,7 @@
           <a:p>
             <a:fld id="{B5453A2F-AD27-4E66-90E5-CEA494DEF62A}" type="datetimeFigureOut">
               <a:rPr lang="de-DE" smtClean="0"/>
-              <a:t>06.07.2022</a:t>
+              <a:t>07.07.2022</a:t>
             </a:fld>
             <a:endParaRPr lang="de-DE"/>
           </a:p>
@@ -2510,7 +2510,7 @@
           <a:p>
             <a:fld id="{B5453A2F-AD27-4E66-90E5-CEA494DEF62A}" type="datetimeFigureOut">
               <a:rPr lang="de-DE" smtClean="0"/>
-              <a:t>06.07.2022</a:t>
+              <a:t>07.07.2022</a:t>
             </a:fld>
             <a:endParaRPr lang="de-DE"/>
           </a:p>
@@ -2723,7 +2723,7 @@
           <a:p>
             <a:fld id="{B5453A2F-AD27-4E66-90E5-CEA494DEF62A}" type="datetimeFigureOut">
               <a:rPr lang="de-DE" smtClean="0"/>
-              <a:t>06.07.2022</a:t>
+              <a:t>07.07.2022</a:t>
             </a:fld>
             <a:endParaRPr lang="de-DE"/>
           </a:p>
@@ -4135,14 +4135,14 @@
       </p:sp>
       <p:sp>
         <p:nvSpPr>
-          <p:cNvPr id="4" name="Rechteck 3"/>
+          <p:cNvPr id="8" name="Rechteck 7"/>
           <p:cNvSpPr/>
           <p:nvPr/>
         </p:nvSpPr>
         <p:spPr>
           <a:xfrm>
-            <a:off x="4428731" y="612346"/>
-            <a:ext cx="1429507" cy="402445"/>
+            <a:off x="3266434" y="2780928"/>
+            <a:ext cx="1736793" cy="700797"/>
           </a:xfrm>
           <a:prstGeom prst="rect">
             <a:avLst/>
@@ -4178,80 +4178,12 @@
           <a:p>
             <a:pPr algn="ctr"/>
             <a:r>
-              <a:rPr lang="de-DE" sz="1000" dirty="0" smtClean="0">
-                <a:solidFill>
-                  <a:schemeClr val="tx1"/>
-                </a:solidFill>
-              </a:rPr>
-              <a:t>UI</a:t>
-            </a:r>
-            <a:endParaRPr lang="de-DE" sz="1000" dirty="0">
-              <a:solidFill>
-                <a:schemeClr val="tx1"/>
-              </a:solidFill>
-            </a:endParaRPr>
-          </a:p>
-        </p:txBody>
-      </p:sp>
-      <p:sp>
-        <p:nvSpPr>
-          <p:cNvPr id="8" name="Rechteck 7"/>
-          <p:cNvSpPr/>
-          <p:nvPr/>
-        </p:nvSpPr>
-        <p:spPr>
-          <a:xfrm>
-            <a:off x="3266434" y="2977669"/>
-            <a:ext cx="1736793" cy="504056"/>
-          </a:xfrm>
-          <a:prstGeom prst="rect">
-            <a:avLst/>
-          </a:prstGeom>
-          <a:solidFill>
-            <a:schemeClr val="bg1"/>
-          </a:solidFill>
-          <a:ln>
-            <a:solidFill>
-              <a:schemeClr val="tx1"/>
-            </a:solidFill>
-          </a:ln>
-        </p:spPr>
-        <p:style>
-          <a:lnRef idx="2">
-            <a:schemeClr val="accent1">
-              <a:shade val="50000"/>
-            </a:schemeClr>
-          </a:lnRef>
-          <a:fillRef idx="1">
-            <a:schemeClr val="accent1"/>
-          </a:fillRef>
-          <a:effectRef idx="0">
-            <a:schemeClr val="accent1"/>
-          </a:effectRef>
-          <a:fontRef idx="minor">
-            <a:schemeClr val="lt1"/>
-          </a:fontRef>
-        </p:style>
-        <p:txBody>
-          <a:bodyPr rtlCol="0" anchor="ctr"/>
-          <a:lstStyle/>
-          <a:p>
-            <a:pPr algn="ctr"/>
-            <a:r>
               <a:rPr lang="de-DE" sz="1000" smtClean="0">
                 <a:solidFill>
                   <a:schemeClr val="tx1"/>
                 </a:solidFill>
               </a:rPr>
-              <a:t>Storing</a:t>
-            </a:r>
-            <a:r>
-              <a:rPr lang="de-DE" sz="1000" smtClean="0">
-                <a:solidFill>
-                  <a:schemeClr val="tx1"/>
-                </a:solidFill>
-              </a:rPr>
-              <a:t>Controller</a:t>
+              <a:t>StoringController</a:t>
             </a:r>
             <a:endParaRPr lang="de-DE" sz="1000" dirty="0">
               <a:solidFill>
@@ -4518,8 +4450,8 @@
         </p:nvSpPr>
         <p:spPr>
           <a:xfrm>
-            <a:off x="5080542" y="2974889"/>
-            <a:ext cx="1736793" cy="504056"/>
+            <a:off x="5080542" y="2780928"/>
+            <a:ext cx="1736793" cy="698017"/>
           </a:xfrm>
           <a:prstGeom prst="rect">
             <a:avLst/>
@@ -5035,7 +4967,7 @@
         <p:spPr>
           <a:xfrm>
             <a:off x="3450985" y="1334877"/>
-            <a:ext cx="588623" cy="246221"/>
+            <a:ext cx="1000595" cy="246221"/>
           </a:xfrm>
           <a:prstGeom prst="rect">
             <a:avLst/>
@@ -5050,7 +4982,7 @@
           <a:p>
             <a:r>
               <a:rPr lang="de-DE" sz="1000" dirty="0" err="1" smtClean="0"/>
-              <a:t>IStoring</a:t>
+              <a:t>IStoringForUser</a:t>
             </a:r>
             <a:endParaRPr lang="de-DE" sz="1000" dirty="0"/>
           </a:p>
@@ -5166,7 +5098,7 @@
         </p:nvGrpSpPr>
         <p:grpSpPr>
           <a:xfrm>
-            <a:off x="4862031" y="1583889"/>
+            <a:off x="5023585" y="1581097"/>
             <a:ext cx="360040" cy="678361"/>
             <a:chOff x="2339752" y="3265729"/>
             <a:chExt cx="360040" cy="678361"/>
@@ -5268,8 +5200,8 @@
         </p:nvSpPr>
         <p:spPr>
           <a:xfrm>
-            <a:off x="4660312" y="1334876"/>
-            <a:ext cx="798617" cy="246221"/>
+            <a:off x="4838715" y="1334876"/>
+            <a:ext cx="1210588" cy="246221"/>
           </a:xfrm>
           <a:prstGeom prst="rect">
             <a:avLst/>
@@ -5284,7 +5216,7 @@
           <a:p>
             <a:r>
               <a:rPr lang="de-DE" sz="1000" dirty="0" err="1" smtClean="0"/>
-              <a:t>IRequesting</a:t>
+              <a:t>IRequestingForUser</a:t>
             </a:r>
             <a:endParaRPr lang="de-DE" sz="1000" dirty="0"/>
           </a:p>
@@ -5298,10 +5230,10 @@
         </p:nvGrpSpPr>
         <p:grpSpPr>
           <a:xfrm rot="16200000">
-            <a:off x="3548651" y="2136717"/>
-            <a:ext cx="386970" cy="154195"/>
-            <a:chOff x="1304710" y="2132856"/>
-            <a:chExt cx="386970" cy="154195"/>
+            <a:off x="3361837" y="2323531"/>
+            <a:ext cx="760598" cy="154195"/>
+            <a:chOff x="931082" y="2132856"/>
+            <a:chExt cx="760598" cy="154195"/>
           </a:xfrm>
         </p:grpSpPr>
         <p:cxnSp>
@@ -5311,9 +5243,9 @@
             <p:nvPr/>
           </p:nvCxnSpPr>
           <p:spPr>
-            <a:xfrm>
-              <a:off x="1304710" y="2204864"/>
-              <a:ext cx="242954" cy="0"/>
+            <a:xfrm rot="5400000" flipH="1" flipV="1">
+              <a:off x="1232703" y="1903243"/>
+              <a:ext cx="13339" cy="616582"/>
             </a:xfrm>
             <a:prstGeom prst="line">
               <a:avLst/>
@@ -5394,10 +5326,10 @@
         </p:nvGrpSpPr>
         <p:grpSpPr>
           <a:xfrm rot="16200000">
-            <a:off x="4836805" y="2146472"/>
-            <a:ext cx="386970" cy="154195"/>
-            <a:chOff x="1304710" y="2132856"/>
-            <a:chExt cx="386970" cy="154195"/>
+            <a:off x="4833272" y="2328409"/>
+            <a:ext cx="750843" cy="154195"/>
+            <a:chOff x="940837" y="2132856"/>
+            <a:chExt cx="750843" cy="154195"/>
           </a:xfrm>
         </p:grpSpPr>
         <p:cxnSp>
@@ -5407,9 +5339,9 @@
             <p:nvPr/>
           </p:nvCxnSpPr>
           <p:spPr>
-            <a:xfrm>
-              <a:off x="1304710" y="2204864"/>
-              <a:ext cx="242954" cy="0"/>
+            <a:xfrm rot="5400000" flipH="1" flipV="1">
+              <a:off x="1241706" y="1903996"/>
+              <a:ext cx="5089" cy="606827"/>
             </a:xfrm>
             <a:prstGeom prst="line">
               <a:avLst/>

</xml_diff>

<commit_message>
Changed assemblies interface position inside documentation
</commit_message>
<xml_diff>
--- a/documentation/Architecture_v0.1.0.pptx
+++ b/documentation/Architecture_v0.1.0.pptx
@@ -290,7 +290,7 @@
           <a:p>
             <a:fld id="{B5453A2F-AD27-4E66-90E5-CEA494DEF62A}" type="datetimeFigureOut">
               <a:rPr lang="de-DE" smtClean="0"/>
-              <a:t>10.07.2022</a:t>
+              <a:t>13.07.2022</a:t>
             </a:fld>
             <a:endParaRPr lang="de-DE"/>
           </a:p>
@@ -460,7 +460,7 @@
           <a:p>
             <a:fld id="{B5453A2F-AD27-4E66-90E5-CEA494DEF62A}" type="datetimeFigureOut">
               <a:rPr lang="de-DE" smtClean="0"/>
-              <a:t>10.07.2022</a:t>
+              <a:t>13.07.2022</a:t>
             </a:fld>
             <a:endParaRPr lang="de-DE"/>
           </a:p>
@@ -640,7 +640,7 @@
           <a:p>
             <a:fld id="{B5453A2F-AD27-4E66-90E5-CEA494DEF62A}" type="datetimeFigureOut">
               <a:rPr lang="de-DE" smtClean="0"/>
-              <a:t>10.07.2022</a:t>
+              <a:t>13.07.2022</a:t>
             </a:fld>
             <a:endParaRPr lang="de-DE"/>
           </a:p>
@@ -810,7 +810,7 @@
           <a:p>
             <a:fld id="{B5453A2F-AD27-4E66-90E5-CEA494DEF62A}" type="datetimeFigureOut">
               <a:rPr lang="de-DE" smtClean="0"/>
-              <a:t>10.07.2022</a:t>
+              <a:t>13.07.2022</a:t>
             </a:fld>
             <a:endParaRPr lang="de-DE"/>
           </a:p>
@@ -1056,7 +1056,7 @@
           <a:p>
             <a:fld id="{B5453A2F-AD27-4E66-90E5-CEA494DEF62A}" type="datetimeFigureOut">
               <a:rPr lang="de-DE" smtClean="0"/>
-              <a:t>10.07.2022</a:t>
+              <a:t>13.07.2022</a:t>
             </a:fld>
             <a:endParaRPr lang="de-DE"/>
           </a:p>
@@ -1344,7 +1344,7 @@
           <a:p>
             <a:fld id="{B5453A2F-AD27-4E66-90E5-CEA494DEF62A}" type="datetimeFigureOut">
               <a:rPr lang="de-DE" smtClean="0"/>
-              <a:t>10.07.2022</a:t>
+              <a:t>13.07.2022</a:t>
             </a:fld>
             <a:endParaRPr lang="de-DE"/>
           </a:p>
@@ -1766,7 +1766,7 @@
           <a:p>
             <a:fld id="{B5453A2F-AD27-4E66-90E5-CEA494DEF62A}" type="datetimeFigureOut">
               <a:rPr lang="de-DE" smtClean="0"/>
-              <a:t>10.07.2022</a:t>
+              <a:t>13.07.2022</a:t>
             </a:fld>
             <a:endParaRPr lang="de-DE"/>
           </a:p>
@@ -1884,7 +1884,7 @@
           <a:p>
             <a:fld id="{B5453A2F-AD27-4E66-90E5-CEA494DEF62A}" type="datetimeFigureOut">
               <a:rPr lang="de-DE" smtClean="0"/>
-              <a:t>10.07.2022</a:t>
+              <a:t>13.07.2022</a:t>
             </a:fld>
             <a:endParaRPr lang="de-DE"/>
           </a:p>
@@ -1979,7 +1979,7 @@
           <a:p>
             <a:fld id="{B5453A2F-AD27-4E66-90E5-CEA494DEF62A}" type="datetimeFigureOut">
               <a:rPr lang="de-DE" smtClean="0"/>
-              <a:t>10.07.2022</a:t>
+              <a:t>13.07.2022</a:t>
             </a:fld>
             <a:endParaRPr lang="de-DE"/>
           </a:p>
@@ -2256,7 +2256,7 @@
           <a:p>
             <a:fld id="{B5453A2F-AD27-4E66-90E5-CEA494DEF62A}" type="datetimeFigureOut">
               <a:rPr lang="de-DE" smtClean="0"/>
-              <a:t>10.07.2022</a:t>
+              <a:t>13.07.2022</a:t>
             </a:fld>
             <a:endParaRPr lang="de-DE"/>
           </a:p>
@@ -2509,7 +2509,7 @@
           <a:p>
             <a:fld id="{B5453A2F-AD27-4E66-90E5-CEA494DEF62A}" type="datetimeFigureOut">
               <a:rPr lang="de-DE" smtClean="0"/>
-              <a:t>10.07.2022</a:t>
+              <a:t>13.07.2022</a:t>
             </a:fld>
             <a:endParaRPr lang="de-DE"/>
           </a:p>
@@ -2722,7 +2722,7 @@
           <a:p>
             <a:fld id="{B5453A2F-AD27-4E66-90E5-CEA494DEF62A}" type="datetimeFigureOut">
               <a:rPr lang="de-DE" smtClean="0"/>
-              <a:t>10.07.2022</a:t>
+              <a:t>13.07.2022</a:t>
             </a:fld>
             <a:endParaRPr lang="de-DE"/>
           </a:p>
@@ -4605,7 +4605,7 @@
         </p:nvSpPr>
         <p:spPr>
           <a:xfrm>
-            <a:off x="3946898" y="3517774"/>
+            <a:off x="3836047" y="4007343"/>
             <a:ext cx="1133644" cy="246221"/>
           </a:xfrm>
           <a:prstGeom prst="rect">
@@ -4935,7 +4935,7 @@
         </p:nvSpPr>
         <p:spPr>
           <a:xfrm>
-            <a:off x="5220454" y="3517774"/>
+            <a:off x="5161808" y="3999609"/>
             <a:ext cx="1343638" cy="246221"/>
           </a:xfrm>
           <a:prstGeom prst="rect">
@@ -4965,7 +4965,7 @@
         </p:nvSpPr>
         <p:spPr>
           <a:xfrm>
-            <a:off x="3450985" y="1334877"/>
+            <a:off x="3684074" y="2222468"/>
             <a:ext cx="1000595" cy="246221"/>
           </a:xfrm>
           <a:prstGeom prst="rect">
@@ -5199,7 +5199,7 @@
         </p:nvSpPr>
         <p:spPr>
           <a:xfrm>
-            <a:off x="4838715" y="1334876"/>
+            <a:off x="5188336" y="2204794"/>
             <a:ext cx="1210588" cy="246221"/>
           </a:xfrm>
           <a:prstGeom prst="rect">

</xml_diff>

<commit_message>
some changes to documentation
</commit_message>
<xml_diff>
--- a/documentation/Architecture_v0.1.0.pptx
+++ b/documentation/Architecture_v0.1.0.pptx
@@ -3958,7 +3958,7 @@
         </p:nvSpPr>
         <p:spPr>
           <a:xfrm>
-            <a:off x="2988395" y="448484"/>
+            <a:off x="1916530" y="448483"/>
             <a:ext cx="4032448" cy="1132614"/>
           </a:xfrm>
           <a:prstGeom prst="rect">
@@ -4018,7 +4018,7 @@
         </p:nvSpPr>
         <p:spPr>
           <a:xfrm>
-            <a:off x="2972925" y="2431926"/>
+            <a:off x="1901060" y="2431925"/>
             <a:ext cx="4032448" cy="1368120"/>
           </a:xfrm>
           <a:prstGeom prst="rect">
@@ -4078,7 +4078,7 @@
         </p:nvSpPr>
         <p:spPr>
           <a:xfrm>
-            <a:off x="2972925" y="4202052"/>
+            <a:off x="1901060" y="4202051"/>
             <a:ext cx="4032448" cy="1436015"/>
           </a:xfrm>
           <a:prstGeom prst="rect">
@@ -4140,7 +4140,7 @@
         </p:nvSpPr>
         <p:spPr>
           <a:xfrm>
-            <a:off x="3266434" y="2780928"/>
+            <a:off x="2194569" y="2780927"/>
             <a:ext cx="1736793" cy="700797"/>
           </a:xfrm>
           <a:prstGeom prst="rect">
@@ -4200,7 +4200,7 @@
         </p:nvSpPr>
         <p:spPr>
           <a:xfrm>
-            <a:off x="3387713" y="4333287"/>
+            <a:off x="2315848" y="4333286"/>
             <a:ext cx="1234159" cy="1200550"/>
           </a:xfrm>
           <a:prstGeom prst="rect">
@@ -4260,7 +4260,7 @@
         </p:nvSpPr>
         <p:spPr>
           <a:xfrm>
-            <a:off x="4166194" y="5779159"/>
+            <a:off x="3094329" y="5779158"/>
             <a:ext cx="864096" cy="936104"/>
           </a:xfrm>
           <a:prstGeom prst="can">
@@ -4326,7 +4326,7 @@
         </p:nvSpPr>
         <p:spPr>
           <a:xfrm>
-            <a:off x="1389566" y="416737"/>
+            <a:off x="317701" y="416736"/>
             <a:ext cx="909174" cy="5221329"/>
           </a:xfrm>
           <a:prstGeom prst="rect">
@@ -4389,7 +4389,7 @@
         </p:nvSpPr>
         <p:spPr>
           <a:xfrm>
-            <a:off x="4684669" y="4333287"/>
+            <a:off x="3612804" y="4333286"/>
             <a:ext cx="1092827" cy="1209216"/>
           </a:xfrm>
           <a:prstGeom prst="rect">
@@ -4449,7 +4449,7 @@
         </p:nvSpPr>
         <p:spPr>
           <a:xfrm>
-            <a:off x="5080542" y="2780928"/>
+            <a:off x="4008677" y="2780927"/>
             <a:ext cx="1736793" cy="698017"/>
           </a:xfrm>
           <a:prstGeom prst="rect">
@@ -4509,7 +4509,7 @@
         </p:nvGrpSpPr>
         <p:grpSpPr>
           <a:xfrm rot="16200000">
-            <a:off x="3698097" y="4052949"/>
+            <a:off x="2626232" y="4052948"/>
             <a:ext cx="386970" cy="154195"/>
             <a:chOff x="1304710" y="2132856"/>
             <a:chExt cx="386970" cy="154195"/>
@@ -4605,7 +4605,7 @@
         </p:nvSpPr>
         <p:spPr>
           <a:xfrm>
-            <a:off x="3836047" y="4007343"/>
+            <a:off x="2764182" y="4007342"/>
             <a:ext cx="1133644" cy="246221"/>
           </a:xfrm>
           <a:prstGeom prst="rect">
@@ -4635,7 +4635,7 @@
         </p:nvGrpSpPr>
         <p:grpSpPr>
           <a:xfrm rot="16200000">
-            <a:off x="4986251" y="4062704"/>
+            <a:off x="3914386" y="4062703"/>
             <a:ext cx="386970" cy="154195"/>
             <a:chOff x="1304710" y="2132856"/>
             <a:chExt cx="386970" cy="154195"/>
@@ -4731,7 +4731,7 @@
         </p:nvGrpSpPr>
         <p:grpSpPr>
           <a:xfrm>
-            <a:off x="3706473" y="3481725"/>
+            <a:off x="2634608" y="3481724"/>
             <a:ext cx="360040" cy="678361"/>
             <a:chOff x="2339752" y="3265729"/>
             <a:chExt cx="360040" cy="678361"/>
@@ -4833,7 +4833,7 @@
         </p:nvGrpSpPr>
         <p:grpSpPr>
           <a:xfrm>
-            <a:off x="5003227" y="3481725"/>
+            <a:off x="3931362" y="3481724"/>
             <a:ext cx="360040" cy="678361"/>
             <a:chOff x="2339752" y="3265729"/>
             <a:chExt cx="360040" cy="678361"/>
@@ -4935,7 +4935,7 @@
         </p:nvSpPr>
         <p:spPr>
           <a:xfrm>
-            <a:off x="5161808" y="3999609"/>
+            <a:off x="4089943" y="3999608"/>
             <a:ext cx="1343638" cy="246221"/>
           </a:xfrm>
           <a:prstGeom prst="rect">
@@ -4965,7 +4965,7 @@
         </p:nvSpPr>
         <p:spPr>
           <a:xfrm>
-            <a:off x="3684074" y="2222468"/>
+            <a:off x="2612209" y="2222467"/>
             <a:ext cx="1000595" cy="246221"/>
           </a:xfrm>
           <a:prstGeom prst="rect">
@@ -4995,7 +4995,7 @@
         </p:nvGrpSpPr>
         <p:grpSpPr>
           <a:xfrm>
-            <a:off x="3565277" y="1583889"/>
+            <a:off x="2493412" y="1583888"/>
             <a:ext cx="360040" cy="678361"/>
             <a:chOff x="2339752" y="3265729"/>
             <a:chExt cx="360040" cy="678361"/>
@@ -5097,7 +5097,7 @@
         </p:nvGrpSpPr>
         <p:grpSpPr>
           <a:xfrm>
-            <a:off x="5023585" y="1581097"/>
+            <a:off x="3951720" y="1581096"/>
             <a:ext cx="360040" cy="678361"/>
             <a:chOff x="2339752" y="3265729"/>
             <a:chExt cx="360040" cy="678361"/>
@@ -5199,7 +5199,7 @@
         </p:nvSpPr>
         <p:spPr>
           <a:xfrm>
-            <a:off x="5188336" y="2204794"/>
+            <a:off x="4116471" y="2204793"/>
             <a:ext cx="1210588" cy="246221"/>
           </a:xfrm>
           <a:prstGeom prst="rect">
@@ -5229,7 +5229,7 @@
         </p:nvGrpSpPr>
         <p:grpSpPr>
           <a:xfrm rot="16200000">
-            <a:off x="3361837" y="2323531"/>
+            <a:off x="2289972" y="2323530"/>
             <a:ext cx="760598" cy="154195"/>
             <a:chOff x="931082" y="2132856"/>
             <a:chExt cx="760598" cy="154195"/>
@@ -5325,7 +5325,7 @@
         </p:nvGrpSpPr>
         <p:grpSpPr>
           <a:xfrm rot="16200000">
-            <a:off x="4833272" y="2328409"/>
+            <a:off x="3761407" y="2328408"/>
             <a:ext cx="750843" cy="154195"/>
             <a:chOff x="940837" y="2132856"/>
             <a:chExt cx="750843" cy="154195"/>
@@ -5421,10 +5421,10 @@
         </p:nvGrpSpPr>
         <p:grpSpPr>
           <a:xfrm rot="16200000">
-            <a:off x="2610566" y="2544379"/>
-            <a:ext cx="360040" cy="983691"/>
-            <a:chOff x="2604071" y="2390774"/>
-            <a:chExt cx="360040" cy="983691"/>
+            <a:off x="1543391" y="2549068"/>
+            <a:ext cx="360040" cy="974312"/>
+            <a:chOff x="2604071" y="2400153"/>
+            <a:chExt cx="360040" cy="974312"/>
           </a:xfrm>
         </p:grpSpPr>
         <p:grpSp>
@@ -5435,23 +5435,21 @@
           </p:nvGrpSpPr>
           <p:grpSpPr>
             <a:xfrm>
-              <a:off x="2604071" y="2390774"/>
-              <a:ext cx="360040" cy="465013"/>
-              <a:chOff x="2339752" y="3479077"/>
-              <a:chExt cx="360040" cy="465013"/>
+              <a:off x="2604071" y="2400153"/>
+              <a:ext cx="360040" cy="455634"/>
+              <a:chOff x="2339752" y="3488456"/>
+              <a:chExt cx="360040" cy="455634"/>
             </a:xfrm>
           </p:grpSpPr>
           <p:cxnSp>
             <p:nvCxnSpPr>
               <p:cNvPr id="56" name="Gerade Verbindung 55"/>
-              <p:cNvCxnSpPr>
-                <a:endCxn id="14" idx="3"/>
-              </p:cNvCxnSpPr>
+              <p:cNvCxnSpPr/>
               <p:nvPr/>
             </p:nvCxnSpPr>
             <p:spPr>
               <a:xfrm rot="5400000" flipH="1" flipV="1">
-                <a:off x="2471695" y="3527153"/>
+                <a:off x="2455618" y="3536532"/>
                 <a:ext cx="104975" cy="8823"/>
               </a:xfrm>
               <a:prstGeom prst="line">
@@ -5636,7 +5634,7 @@
         </p:nvSpPr>
         <p:spPr>
           <a:xfrm>
-            <a:off x="1984252" y="2603504"/>
+            <a:off x="912387" y="2603503"/>
             <a:ext cx="681597" cy="246221"/>
           </a:xfrm>
           <a:prstGeom prst="rect">
@@ -5653,6 +5651,126 @@
             <a:r>
               <a:rPr lang="de-DE" sz="1000" dirty="0" err="1" smtClean="0"/>
               <a:t>ILoggable</a:t>
+            </a:r>
+            <a:endParaRPr lang="de-DE" sz="1000" dirty="0"/>
+          </a:p>
+        </p:txBody>
+      </p:sp>
+      <p:sp>
+        <p:nvSpPr>
+          <p:cNvPr id="62" name="Textfeld 61"/>
+          <p:cNvSpPr txBox="1"/>
+          <p:nvPr/>
+        </p:nvSpPr>
+        <p:spPr>
+          <a:xfrm>
+            <a:off x="2813875" y="4130452"/>
+            <a:ext cx="1083951" cy="246221"/>
+          </a:xfrm>
+          <a:prstGeom prst="rect">
+            <a:avLst/>
+          </a:prstGeom>
+          <a:noFill/>
+        </p:spPr>
+        <p:txBody>
+          <a:bodyPr wrap="none" rtlCol="0">
+            <a:spAutoFit/>
+          </a:bodyPr>
+          <a:lstStyle/>
+          <a:p>
+            <a:r>
+              <a:rPr lang="de-DE" sz="1000" dirty="0" err="1" smtClean="0"/>
+              <a:t>IConfigSelectable</a:t>
+            </a:r>
+            <a:endParaRPr lang="de-DE" sz="1000" dirty="0"/>
+          </a:p>
+        </p:txBody>
+      </p:sp>
+      <p:sp>
+        <p:nvSpPr>
+          <p:cNvPr id="63" name="Textfeld 62"/>
+          <p:cNvSpPr txBox="1"/>
+          <p:nvPr/>
+        </p:nvSpPr>
+        <p:spPr>
+          <a:xfrm>
+            <a:off x="4131740" y="4130452"/>
+            <a:ext cx="1083951" cy="246221"/>
+          </a:xfrm>
+          <a:prstGeom prst="rect">
+            <a:avLst/>
+          </a:prstGeom>
+          <a:noFill/>
+        </p:spPr>
+        <p:txBody>
+          <a:bodyPr wrap="none" rtlCol="0">
+            <a:spAutoFit/>
+          </a:bodyPr>
+          <a:lstStyle/>
+          <a:p>
+            <a:r>
+              <a:rPr lang="de-DE" sz="1000" dirty="0" err="1" smtClean="0"/>
+              <a:t>IConfigSelectable</a:t>
+            </a:r>
+            <a:endParaRPr lang="de-DE" sz="1000" dirty="0"/>
+          </a:p>
+        </p:txBody>
+      </p:sp>
+      <p:sp>
+        <p:nvSpPr>
+          <p:cNvPr id="64" name="Textfeld 63"/>
+          <p:cNvSpPr txBox="1"/>
+          <p:nvPr/>
+        </p:nvSpPr>
+        <p:spPr>
+          <a:xfrm>
+            <a:off x="2622088" y="2431925"/>
+            <a:ext cx="1495922" cy="246221"/>
+          </a:xfrm>
+          <a:prstGeom prst="rect">
+            <a:avLst/>
+          </a:prstGeom>
+          <a:noFill/>
+        </p:spPr>
+        <p:txBody>
+          <a:bodyPr wrap="none" rtlCol="0">
+            <a:spAutoFit/>
+          </a:bodyPr>
+          <a:lstStyle/>
+          <a:p>
+            <a:r>
+              <a:rPr lang="de-DE" sz="1000" dirty="0" err="1" smtClean="0"/>
+              <a:t>IConfigSelectableForUser</a:t>
+            </a:r>
+            <a:endParaRPr lang="de-DE" sz="1000" dirty="0"/>
+          </a:p>
+        </p:txBody>
+      </p:sp>
+      <p:sp>
+        <p:nvSpPr>
+          <p:cNvPr id="65" name="Textfeld 64"/>
+          <p:cNvSpPr txBox="1"/>
+          <p:nvPr/>
+        </p:nvSpPr>
+        <p:spPr>
+          <a:xfrm>
+            <a:off x="4136829" y="2431924"/>
+            <a:ext cx="1495922" cy="246221"/>
+          </a:xfrm>
+          <a:prstGeom prst="rect">
+            <a:avLst/>
+          </a:prstGeom>
+          <a:noFill/>
+        </p:spPr>
+        <p:txBody>
+          <a:bodyPr wrap="none" rtlCol="0">
+            <a:spAutoFit/>
+          </a:bodyPr>
+          <a:lstStyle/>
+          <a:p>
+            <a:r>
+              <a:rPr lang="de-DE" sz="1000" dirty="0" err="1" smtClean="0"/>
+              <a:t>IConfigSelectableForUser</a:t>
             </a:r>
             <a:endParaRPr lang="de-DE" sz="1000" dirty="0"/>
           </a:p>

</xml_diff>